<commit_message>
up-to-date Visualize presentation files
</commit_message>
<xml_diff>
--- a/slides/01_Visualize.pptx
+++ b/slides/01_Visualize.pptx
@@ -5,7 +5,7 @@
     <p:sldMasterId id="2147483648" r:id="rId1"/>
   </p:sldMasterIdLst>
   <p:notesMasterIdLst>
-    <p:notesMasterId r:id="rId74"/>
+    <p:notesMasterId r:id="rId75"/>
   </p:notesMasterIdLst>
   <p:sldIdLst>
     <p:sldId id="256" r:id="rId2"/>
@@ -73,13 +73,14 @@
     <p:sldId id="306" r:id="rId64"/>
     <p:sldId id="326" r:id="rId65"/>
     <p:sldId id="327" r:id="rId66"/>
-    <p:sldId id="301" r:id="rId67"/>
-    <p:sldId id="328" r:id="rId68"/>
-    <p:sldId id="329" r:id="rId69"/>
-    <p:sldId id="330" r:id="rId70"/>
-    <p:sldId id="331" r:id="rId71"/>
-    <p:sldId id="307" r:id="rId72"/>
-    <p:sldId id="332" r:id="rId73"/>
+    <p:sldId id="333" r:id="rId67"/>
+    <p:sldId id="301" r:id="rId68"/>
+    <p:sldId id="328" r:id="rId69"/>
+    <p:sldId id="329" r:id="rId70"/>
+    <p:sldId id="330" r:id="rId71"/>
+    <p:sldId id="331" r:id="rId72"/>
+    <p:sldId id="307" r:id="rId73"/>
+    <p:sldId id="332" r:id="rId74"/>
   </p:sldIdLst>
   <p:sldSz cx="12192000" cy="6858000"/>
   <p:notesSz cx="9144000" cy="6858000"/>
@@ -280,7 +281,7 @@
           <a:p>
             <a:fld id="{FDC4B335-33D5-4EA8-A5E8-130D36D513BC}" type="datetimeFigureOut">
               <a:rPr lang="en-US" smtClean="0"/>
-              <a:t>10/25/2019</a:t>
+              <a:t>10/28/2019</a:t>
             </a:fld>
             <a:endParaRPr lang="en-US"/>
           </a:p>
@@ -1426,7 +1427,7 @@
           <a:p>
             <a:fld id="{0FF0CA17-7278-4700-B5CE-AAA297DB0216}" type="datetime1">
               <a:rPr lang="en-US" smtClean="0"/>
-              <a:t>10/25/2019</a:t>
+              <a:t>10/28/2019</a:t>
             </a:fld>
             <a:endParaRPr lang="en-US"/>
           </a:p>
@@ -1627,7 +1628,7 @@
           <a:p>
             <a:fld id="{B2D433B3-BCFF-4536-8BFC-DB6CE82D3861}" type="datetime1">
               <a:rPr lang="en-US" smtClean="0"/>
-              <a:t>10/25/2019</a:t>
+              <a:t>10/28/2019</a:t>
             </a:fld>
             <a:endParaRPr lang="en-US"/>
           </a:p>
@@ -1838,7 +1839,7 @@
           <a:p>
             <a:fld id="{8CBA58B8-4C0F-4A2E-93DA-1FCC4CD183B7}" type="datetime1">
               <a:rPr lang="en-US" smtClean="0"/>
-              <a:t>10/25/2019</a:t>
+              <a:t>10/28/2019</a:t>
             </a:fld>
             <a:endParaRPr lang="en-US"/>
           </a:p>
@@ -2039,7 +2040,7 @@
           <a:p>
             <a:fld id="{795CD272-CC15-42B1-AF94-9465F36A1690}" type="datetime1">
               <a:rPr lang="en-US" smtClean="0"/>
-              <a:t>10/25/2019</a:t>
+              <a:t>10/28/2019</a:t>
             </a:fld>
             <a:endParaRPr lang="en-US"/>
           </a:p>
@@ -2317,7 +2318,7 @@
           <a:p>
             <a:fld id="{1C3236FD-8D2C-4B3F-A29E-CB63FDCD539A}" type="datetime1">
               <a:rPr lang="en-US" smtClean="0"/>
-              <a:t>10/25/2019</a:t>
+              <a:t>10/28/2019</a:t>
             </a:fld>
             <a:endParaRPr lang="en-US"/>
           </a:p>
@@ -2585,7 +2586,7 @@
           <a:p>
             <a:fld id="{60B5AC96-BA3E-42B8-9DD5-510E2E2AA307}" type="datetime1">
               <a:rPr lang="en-US" smtClean="0"/>
-              <a:t>10/25/2019</a:t>
+              <a:t>10/28/2019</a:t>
             </a:fld>
             <a:endParaRPr lang="en-US"/>
           </a:p>
@@ -3000,7 +3001,7 @@
           <a:p>
             <a:fld id="{D6636501-AA38-48C6-9AA1-A23E2137491A}" type="datetime1">
               <a:rPr lang="en-US" smtClean="0"/>
-              <a:t>10/25/2019</a:t>
+              <a:t>10/28/2019</a:t>
             </a:fld>
             <a:endParaRPr lang="en-US"/>
           </a:p>
@@ -3144,7 +3145,7 @@
           <a:p>
             <a:fld id="{B53EF110-E9E5-4B7B-A347-686E5BEDA428}" type="datetime1">
               <a:rPr lang="en-US" smtClean="0"/>
-              <a:t>10/25/2019</a:t>
+              <a:t>10/28/2019</a:t>
             </a:fld>
             <a:endParaRPr lang="en-US"/>
           </a:p>
@@ -3260,7 +3261,7 @@
           <a:p>
             <a:fld id="{136C1A73-E73D-44FC-BAE9-A9E28A0B8651}" type="datetime1">
               <a:rPr lang="en-US" smtClean="0"/>
-              <a:t>10/25/2019</a:t>
+              <a:t>10/28/2019</a:t>
             </a:fld>
             <a:endParaRPr lang="en-US"/>
           </a:p>
@@ -3574,7 +3575,7 @@
           <a:p>
             <a:fld id="{9451293F-CAF3-42F8-A522-1C7F378C5BF2}" type="datetime1">
               <a:rPr lang="en-US" smtClean="0"/>
-              <a:t>10/25/2019</a:t>
+              <a:t>10/28/2019</a:t>
             </a:fld>
             <a:endParaRPr lang="en-US"/>
           </a:p>
@@ -3865,7 +3866,7 @@
           <a:p>
             <a:fld id="{EC129065-4C79-4A8C-8F75-FC9BC7A4F7AC}" type="datetime1">
               <a:rPr lang="en-US" smtClean="0"/>
-              <a:t>10/25/2019</a:t>
+              <a:t>10/28/2019</a:t>
             </a:fld>
             <a:endParaRPr lang="en-US"/>
           </a:p>
@@ -4109,7 +4110,7 @@
           <a:p>
             <a:fld id="{3CB72F7B-421E-4633-8B82-31AB232FE78C}" type="datetime1">
               <a:rPr lang="en-US" smtClean="0"/>
-              <a:t>10/25/2019</a:t>
+              <a:t>10/28/2019</a:t>
             </a:fld>
             <a:endParaRPr lang="en-US"/>
           </a:p>
@@ -7434,6 +7435,184 @@
           </a:p>
         </p:txBody>
       </p:sp>
+      <p:grpSp>
+        <p:nvGrpSpPr>
+          <p:cNvPr id="6" name="Group 5">
+            <a:extLst>
+              <a:ext uri="{FF2B5EF4-FFF2-40B4-BE49-F238E27FC236}">
+                <a16:creationId xmlns:a16="http://schemas.microsoft.com/office/drawing/2014/main" id="{0346D7AA-63C5-447E-BCE5-C4D50CE40AA7}"/>
+              </a:ext>
+            </a:extLst>
+          </p:cNvPr>
+          <p:cNvGrpSpPr/>
+          <p:nvPr/>
+        </p:nvGrpSpPr>
+        <p:grpSpPr>
+          <a:xfrm>
+            <a:off x="9064978" y="5441950"/>
+            <a:ext cx="2813307" cy="914400"/>
+            <a:chOff x="9064978" y="5441950"/>
+            <a:chExt cx="2813307" cy="914400"/>
+          </a:xfrm>
+        </p:grpSpPr>
+        <p:sp>
+          <p:nvSpPr>
+            <p:cNvPr id="7" name="Rectangle 6">
+              <a:extLst>
+                <a:ext uri="{FF2B5EF4-FFF2-40B4-BE49-F238E27FC236}">
+                  <a16:creationId xmlns:a16="http://schemas.microsoft.com/office/drawing/2014/main" id="{DD774E3B-766F-4BDF-ABC9-D9CAD273CB99}"/>
+                </a:ext>
+              </a:extLst>
+            </p:cNvPr>
+            <p:cNvSpPr/>
+            <p:nvPr/>
+          </p:nvSpPr>
+          <p:spPr>
+            <a:xfrm>
+              <a:off x="9064978" y="5441950"/>
+              <a:ext cx="2813307" cy="914400"/>
+            </a:xfrm>
+            <a:prstGeom prst="rect">
+              <a:avLst/>
+            </a:prstGeom>
+            <a:solidFill>
+              <a:schemeClr val="bg1">
+                <a:lumMod val="95000"/>
+              </a:schemeClr>
+            </a:solidFill>
+            <a:ln>
+              <a:solidFill>
+                <a:schemeClr val="bg1">
+                  <a:lumMod val="65000"/>
+                </a:schemeClr>
+              </a:solidFill>
+            </a:ln>
+          </p:spPr>
+          <p:style>
+            <a:lnRef idx="2">
+              <a:schemeClr val="accent1">
+                <a:shade val="50000"/>
+              </a:schemeClr>
+            </a:lnRef>
+            <a:fillRef idx="1">
+              <a:schemeClr val="accent1"/>
+            </a:fillRef>
+            <a:effectRef idx="0">
+              <a:schemeClr val="accent1"/>
+            </a:effectRef>
+            <a:fontRef idx="minor">
+              <a:schemeClr val="lt1"/>
+            </a:fontRef>
+          </p:style>
+          <p:txBody>
+            <a:bodyPr rtlCol="0" anchor="ctr"/>
+            <a:lstStyle/>
+            <a:p>
+              <a:pPr algn="ctr"/>
+              <a:endParaRPr lang="en-US"/>
+            </a:p>
+          </p:txBody>
+        </p:sp>
+        <p:grpSp>
+          <p:nvGrpSpPr>
+            <p:cNvPr id="8" name="Group 7">
+              <a:extLst>
+                <a:ext uri="{FF2B5EF4-FFF2-40B4-BE49-F238E27FC236}">
+                  <a16:creationId xmlns:a16="http://schemas.microsoft.com/office/drawing/2014/main" id="{A4A6EB16-D821-4DAC-A9FF-AA58F5DBC630}"/>
+                </a:ext>
+              </a:extLst>
+            </p:cNvPr>
+            <p:cNvGrpSpPr/>
+            <p:nvPr/>
+          </p:nvGrpSpPr>
+          <p:grpSpPr>
+            <a:xfrm>
+              <a:off x="9164782" y="5441950"/>
+              <a:ext cx="2713503" cy="914400"/>
+              <a:chOff x="9164782" y="5441950"/>
+              <a:chExt cx="2713503" cy="914400"/>
+            </a:xfrm>
+          </p:grpSpPr>
+          <p:pic>
+            <p:nvPicPr>
+              <p:cNvPr id="9" name="Graphic 8" descr="Stopwatch">
+                <a:extLst>
+                  <a:ext uri="{FF2B5EF4-FFF2-40B4-BE49-F238E27FC236}">
+                    <a16:creationId xmlns:a16="http://schemas.microsoft.com/office/drawing/2014/main" id="{24CECBF4-DBA7-4394-9513-7BB5B3233185}"/>
+                  </a:ext>
+                </a:extLst>
+              </p:cNvPr>
+              <p:cNvPicPr>
+                <a:picLocks noChangeAspect="1"/>
+              </p:cNvPicPr>
+              <p:nvPr/>
+            </p:nvPicPr>
+            <p:blipFill>
+              <a:blip r:embed="rId2">
+                <a:extLst>
+                  <a:ext uri="{28A0092B-C50C-407E-A947-70E740481C1C}">
+                    <a14:useLocalDpi xmlns:a14="http://schemas.microsoft.com/office/drawing/2010/main" val="0"/>
+                  </a:ext>
+                  <a:ext uri="{96DAC541-7B7A-43D3-8B79-37D633B846F1}">
+                    <asvg:svgBlip xmlns:asvg="http://schemas.microsoft.com/office/drawing/2016/SVG/main" r:embed="rId3"/>
+                  </a:ext>
+                </a:extLst>
+              </a:blip>
+              <a:stretch>
+                <a:fillRect/>
+              </a:stretch>
+            </p:blipFill>
+            <p:spPr>
+              <a:xfrm>
+                <a:off x="9164782" y="5441950"/>
+                <a:ext cx="914400" cy="914400"/>
+              </a:xfrm>
+              <a:prstGeom prst="rect">
+                <a:avLst/>
+              </a:prstGeom>
+            </p:spPr>
+          </p:pic>
+          <p:sp>
+            <p:nvSpPr>
+              <p:cNvPr id="10" name="TextBox 9">
+                <a:extLst>
+                  <a:ext uri="{FF2B5EF4-FFF2-40B4-BE49-F238E27FC236}">
+                    <a16:creationId xmlns:a16="http://schemas.microsoft.com/office/drawing/2014/main" id="{0CC0C595-DB1A-4D82-94E4-6E728952A838}"/>
+                  </a:ext>
+                </a:extLst>
+              </p:cNvPr>
+              <p:cNvSpPr txBox="1"/>
+              <p:nvPr/>
+            </p:nvSpPr>
+            <p:spPr>
+              <a:xfrm>
+                <a:off x="9958853" y="5586909"/>
+                <a:ext cx="1919432" cy="769441"/>
+              </a:xfrm>
+              <a:prstGeom prst="rect">
+                <a:avLst/>
+              </a:prstGeom>
+              <a:noFill/>
+            </p:spPr>
+            <p:txBody>
+              <a:bodyPr wrap="square" rtlCol="0">
+                <a:spAutoFit/>
+              </a:bodyPr>
+              <a:lstStyle/>
+              <a:p>
+                <a:r>
+                  <a:rPr lang="en-US" sz="4400" dirty="0">
+                    <a:latin typeface="Fira Code" panose="020B0809050000020004" pitchFamily="49" charset="0"/>
+                    <a:ea typeface="Fira Code" panose="020B0809050000020004" pitchFamily="49" charset="0"/>
+                    <a:cs typeface="Fira Code" panose="020B0809050000020004" pitchFamily="49" charset="0"/>
+                  </a:rPr>
+                  <a:t>05:00</a:t>
+                </a:r>
+              </a:p>
+            </p:txBody>
+          </p:sp>
+        </p:grpSp>
+      </p:grpSp>
     </p:spTree>
     <p:extLst>
       <p:ext uri="{BB962C8B-B14F-4D97-AF65-F5344CB8AC3E}">
@@ -7782,7 +7961,7 @@
                 <a:ea typeface="Fira Code" panose="020B0809050000020004" pitchFamily="49" charset="0"/>
                 <a:cs typeface="Fira Code" panose="020B0809050000020004" pitchFamily="49" charset="0"/>
               </a:rPr>
-              <a:t>))</a:t>
+              <a:t>)</a:t>
             </a:r>
           </a:p>
         </p:txBody>
@@ -8369,7 +8548,7 @@
                 <a:ea typeface="Fira Code" panose="020B0809050000020004" pitchFamily="49" charset="0"/>
                 <a:cs typeface="Fira Code" panose="020B0809050000020004" pitchFamily="49" charset="0"/>
               </a:rPr>
-              <a:t>))</a:t>
+              <a:t>)</a:t>
             </a:r>
             <a:endParaRPr lang="en-US" dirty="0"/>
           </a:p>
@@ -8751,7 +8930,7 @@
                 <a:ea typeface="Fira Code" panose="020B0809050000020004" pitchFamily="49" charset="0"/>
                 <a:cs typeface="Fira Code" panose="020B0809050000020004" pitchFamily="49" charset="0"/>
               </a:rPr>
-              <a:t>), color = “blue”))</a:t>
+              <a:t>), color = “blue”)</a:t>
             </a:r>
             <a:endParaRPr lang="en-US" sz="2400" dirty="0"/>
           </a:p>
@@ -9290,27 +9469,43 @@
             <p:ph idx="1"/>
           </p:nvPr>
         </p:nvSpPr>
-        <p:spPr/>
-        <p:txBody>
-          <a:bodyPr/>
-          <a:lstStyle/>
-          <a:p>
-            <a:r>
-              <a:rPr lang="en-US" dirty="0"/>
+        <p:spPr>
+          <a:xfrm>
+            <a:off x="838200" y="1870075"/>
+            <a:ext cx="7772400" cy="4306888"/>
+          </a:xfrm>
+        </p:spPr>
+        <p:txBody>
+          <a:bodyPr>
+            <a:normAutofit/>
+          </a:bodyPr>
+          <a:lstStyle/>
+          <a:p>
+            <a:pPr marL="0" indent="0">
+              <a:buNone/>
+            </a:pPr>
+            <a:r>
+              <a:rPr lang="en-US" sz="3200" dirty="0"/>
               <a:t>One of the earliest packages in the </a:t>
             </a:r>
             <a:r>
-              <a:rPr lang="en-US" dirty="0" err="1"/>
+              <a:rPr lang="en-US" sz="3200" dirty="0" err="1"/>
               <a:t>tidyverse</a:t>
             </a:r>
-            <a:endParaRPr lang="en-US" dirty="0"/>
-          </a:p>
-          <a:p>
-            <a:endParaRPr lang="en-US" dirty="0"/>
-          </a:p>
-          <a:p>
-            <a:r>
-              <a:rPr lang="en-US" dirty="0"/>
+            <a:endParaRPr lang="en-US" sz="3200" dirty="0"/>
+          </a:p>
+          <a:p>
+            <a:pPr marL="0" indent="0">
+              <a:buNone/>
+            </a:pPr>
+            <a:endParaRPr lang="en-US" sz="3200" dirty="0"/>
+          </a:p>
+          <a:p>
+            <a:pPr marL="0" indent="0">
+              <a:buNone/>
+            </a:pPr>
+            <a:r>
+              <a:rPr lang="en-US" sz="3200" dirty="0"/>
               <a:t>Implements the “grammar of graphics”</a:t>
             </a:r>
           </a:p>
@@ -9338,7 +9533,7 @@
         </p:blipFill>
         <p:spPr>
           <a:xfrm>
-            <a:off x="8186076" y="1825625"/>
+            <a:off x="8271801" y="1897327"/>
             <a:ext cx="3081999" cy="3531091"/>
           </a:xfrm>
           <a:prstGeom prst="rect">
@@ -9368,7 +9563,7 @@
         </p:blipFill>
         <p:spPr>
           <a:xfrm>
-            <a:off x="618199" y="5473805"/>
+            <a:off x="584332" y="5338868"/>
             <a:ext cx="2552381" cy="838095"/>
           </a:xfrm>
           <a:prstGeom prst="rect">
@@ -11161,31 +11356,19 @@
             </a:r>
             <a:r>
               <a:rPr lang="en-US" dirty="0"/>
-              <a:t> as a scatterplot and facet by station (</a:t>
-            </a:r>
-            <a:r>
-              <a:rPr lang="en-US" dirty="0" err="1">
-                <a:latin typeface="Fira Code" panose="020B0809050000020004" pitchFamily="49" charset="0"/>
-                <a:ea typeface="Fira Code" panose="020B0809050000020004" pitchFamily="49" charset="0"/>
-                <a:cs typeface="Fira Code" panose="020B0809050000020004" pitchFamily="49" charset="0"/>
-              </a:rPr>
-              <a:t>station_code</a:t>
+              <a:t> as a scatterplot and facet by </a:t>
+            </a:r>
+            <a:r>
+              <a:rPr lang="en-US" dirty="0">
+                <a:latin typeface="Fira Code" panose="020B0809050000020004" pitchFamily="49" charset="0"/>
+                <a:ea typeface="Fira Code" panose="020B0809050000020004" pitchFamily="49" charset="0"/>
+                <a:cs typeface="Fira Code" panose="020B0809050000020004" pitchFamily="49" charset="0"/>
+              </a:rPr>
+              <a:t>state</a:t>
             </a:r>
             <a:r>
               <a:rPr lang="en-US" dirty="0"/>
-              <a:t>), </a:t>
-            </a:r>
-            <a:r>
-              <a:rPr lang="en-US" dirty="0">
-                <a:latin typeface="Fira Code" panose="020B0809050000020004" pitchFamily="49" charset="0"/>
-                <a:ea typeface="Fira Code" panose="020B0809050000020004" pitchFamily="49" charset="0"/>
-                <a:cs typeface="Fira Code" panose="020B0809050000020004" pitchFamily="49" charset="0"/>
-              </a:rPr>
-              <a:t>state</a:t>
-            </a:r>
-            <a:r>
-              <a:rPr lang="en-US" dirty="0"/>
-              <a:t>, and </a:t>
+              <a:t> and </a:t>
             </a:r>
             <a:r>
               <a:rPr lang="en-US" dirty="0">
@@ -11204,12 +11387,23 @@
             <a:pPr marL="0" indent="0">
               <a:buNone/>
             </a:pPr>
+            <a:endParaRPr lang="en-US" dirty="0"/>
+          </a:p>
+          <a:p>
+            <a:pPr marL="0" indent="0">
+              <a:buNone/>
+            </a:pPr>
             <a:r>
               <a:rPr lang="en-US" dirty="0"/>
               <a:t>Play around with </a:t>
             </a:r>
             <a:r>
               <a:rPr lang="en-US" dirty="0" err="1">
+                <a:solidFill>
+                  <a:schemeClr val="accent6">
+                    <a:lumMod val="75000"/>
+                  </a:schemeClr>
+                </a:solidFill>
                 <a:latin typeface="Fira Code" panose="020B0809050000020004" pitchFamily="49" charset="0"/>
                 <a:ea typeface="Fira Code" panose="020B0809050000020004" pitchFamily="49" charset="0"/>
                 <a:cs typeface="Fira Code" panose="020B0809050000020004" pitchFamily="49" charset="0"/>
@@ -11230,6 +11424,11 @@
             </a:r>
             <a:r>
               <a:rPr lang="en-US" dirty="0" err="1">
+                <a:solidFill>
+                  <a:schemeClr val="accent6">
+                    <a:lumMod val="75000"/>
+                  </a:schemeClr>
+                </a:solidFill>
                 <a:latin typeface="Fira Code" panose="020B0809050000020004" pitchFamily="49" charset="0"/>
                 <a:ea typeface="Fira Code" panose="020B0809050000020004" pitchFamily="49" charset="0"/>
                 <a:cs typeface="Fira Code" panose="020B0809050000020004" pitchFamily="49" charset="0"/>
@@ -11358,10 +11557,188 @@
               <a:rPr lang="en-US" smtClean="0"/>
               <a:t>24</a:t>
             </a:fld>
-            <a:endParaRPr lang="en-US"/>
-          </a:p>
-        </p:txBody>
-      </p:sp>
+            <a:endParaRPr lang="en-US" dirty="0"/>
+          </a:p>
+        </p:txBody>
+      </p:sp>
+      <p:grpSp>
+        <p:nvGrpSpPr>
+          <p:cNvPr id="6" name="Group 5">
+            <a:extLst>
+              <a:ext uri="{FF2B5EF4-FFF2-40B4-BE49-F238E27FC236}">
+                <a16:creationId xmlns:a16="http://schemas.microsoft.com/office/drawing/2014/main" id="{7F12A382-4121-44EA-96F6-D5F338AB31F5}"/>
+              </a:ext>
+            </a:extLst>
+          </p:cNvPr>
+          <p:cNvGrpSpPr/>
+          <p:nvPr/>
+        </p:nvGrpSpPr>
+        <p:grpSpPr>
+          <a:xfrm>
+            <a:off x="9064978" y="5441950"/>
+            <a:ext cx="2813307" cy="914400"/>
+            <a:chOff x="9064978" y="5441950"/>
+            <a:chExt cx="2813307" cy="914400"/>
+          </a:xfrm>
+        </p:grpSpPr>
+        <p:sp>
+          <p:nvSpPr>
+            <p:cNvPr id="7" name="Rectangle 6">
+              <a:extLst>
+                <a:ext uri="{FF2B5EF4-FFF2-40B4-BE49-F238E27FC236}">
+                  <a16:creationId xmlns:a16="http://schemas.microsoft.com/office/drawing/2014/main" id="{A23C77D4-F857-4F59-81A1-18B57763E884}"/>
+                </a:ext>
+              </a:extLst>
+            </p:cNvPr>
+            <p:cNvSpPr/>
+            <p:nvPr/>
+          </p:nvSpPr>
+          <p:spPr>
+            <a:xfrm>
+              <a:off x="9064978" y="5441950"/>
+              <a:ext cx="2813307" cy="914400"/>
+            </a:xfrm>
+            <a:prstGeom prst="rect">
+              <a:avLst/>
+            </a:prstGeom>
+            <a:solidFill>
+              <a:schemeClr val="bg1">
+                <a:lumMod val="95000"/>
+              </a:schemeClr>
+            </a:solidFill>
+            <a:ln>
+              <a:solidFill>
+                <a:schemeClr val="bg1">
+                  <a:lumMod val="65000"/>
+                </a:schemeClr>
+              </a:solidFill>
+            </a:ln>
+          </p:spPr>
+          <p:style>
+            <a:lnRef idx="2">
+              <a:schemeClr val="accent1">
+                <a:shade val="50000"/>
+              </a:schemeClr>
+            </a:lnRef>
+            <a:fillRef idx="1">
+              <a:schemeClr val="accent1"/>
+            </a:fillRef>
+            <a:effectRef idx="0">
+              <a:schemeClr val="accent1"/>
+            </a:effectRef>
+            <a:fontRef idx="minor">
+              <a:schemeClr val="lt1"/>
+            </a:fontRef>
+          </p:style>
+          <p:txBody>
+            <a:bodyPr rtlCol="0" anchor="ctr"/>
+            <a:lstStyle/>
+            <a:p>
+              <a:pPr algn="ctr"/>
+              <a:endParaRPr lang="en-US"/>
+            </a:p>
+          </p:txBody>
+        </p:sp>
+        <p:grpSp>
+          <p:nvGrpSpPr>
+            <p:cNvPr id="8" name="Group 7">
+              <a:extLst>
+                <a:ext uri="{FF2B5EF4-FFF2-40B4-BE49-F238E27FC236}">
+                  <a16:creationId xmlns:a16="http://schemas.microsoft.com/office/drawing/2014/main" id="{5A84A2CB-B70D-4570-BC5F-CC64A204C997}"/>
+                </a:ext>
+              </a:extLst>
+            </p:cNvPr>
+            <p:cNvGrpSpPr/>
+            <p:nvPr/>
+          </p:nvGrpSpPr>
+          <p:grpSpPr>
+            <a:xfrm>
+              <a:off x="9164782" y="5441950"/>
+              <a:ext cx="2713503" cy="914400"/>
+              <a:chOff x="9164782" y="5441950"/>
+              <a:chExt cx="2713503" cy="914400"/>
+            </a:xfrm>
+          </p:grpSpPr>
+          <p:pic>
+            <p:nvPicPr>
+              <p:cNvPr id="9" name="Graphic 8" descr="Stopwatch">
+                <a:extLst>
+                  <a:ext uri="{FF2B5EF4-FFF2-40B4-BE49-F238E27FC236}">
+                    <a16:creationId xmlns:a16="http://schemas.microsoft.com/office/drawing/2014/main" id="{96E9BC65-6FAD-4F29-8B38-408D98AD3FEB}"/>
+                  </a:ext>
+                </a:extLst>
+              </p:cNvPr>
+              <p:cNvPicPr>
+                <a:picLocks noChangeAspect="1"/>
+              </p:cNvPicPr>
+              <p:nvPr/>
+            </p:nvPicPr>
+            <p:blipFill>
+              <a:blip r:embed="rId2">
+                <a:extLst>
+                  <a:ext uri="{28A0092B-C50C-407E-A947-70E740481C1C}">
+                    <a14:useLocalDpi xmlns:a14="http://schemas.microsoft.com/office/drawing/2010/main" val="0"/>
+                  </a:ext>
+                  <a:ext uri="{96DAC541-7B7A-43D3-8B79-37D633B846F1}">
+                    <asvg:svgBlip xmlns:asvg="http://schemas.microsoft.com/office/drawing/2016/SVG/main" r:embed="rId3"/>
+                  </a:ext>
+                </a:extLst>
+              </a:blip>
+              <a:stretch>
+                <a:fillRect/>
+              </a:stretch>
+            </p:blipFill>
+            <p:spPr>
+              <a:xfrm>
+                <a:off x="9164782" y="5441950"/>
+                <a:ext cx="914400" cy="914400"/>
+              </a:xfrm>
+              <a:prstGeom prst="rect">
+                <a:avLst/>
+              </a:prstGeom>
+            </p:spPr>
+          </p:pic>
+          <p:sp>
+            <p:nvSpPr>
+              <p:cNvPr id="10" name="TextBox 9">
+                <a:extLst>
+                  <a:ext uri="{FF2B5EF4-FFF2-40B4-BE49-F238E27FC236}">
+                    <a16:creationId xmlns:a16="http://schemas.microsoft.com/office/drawing/2014/main" id="{31229579-6799-4A5A-BE85-DC1F7C332C41}"/>
+                  </a:ext>
+                </a:extLst>
+              </p:cNvPr>
+              <p:cNvSpPr txBox="1"/>
+              <p:nvPr/>
+            </p:nvSpPr>
+            <p:spPr>
+              <a:xfrm>
+                <a:off x="9958853" y="5586909"/>
+                <a:ext cx="1919432" cy="769441"/>
+              </a:xfrm>
+              <a:prstGeom prst="rect">
+                <a:avLst/>
+              </a:prstGeom>
+              <a:noFill/>
+            </p:spPr>
+            <p:txBody>
+              <a:bodyPr wrap="square" rtlCol="0">
+                <a:spAutoFit/>
+              </a:bodyPr>
+              <a:lstStyle/>
+              <a:p>
+                <a:r>
+                  <a:rPr lang="en-US" sz="4400" dirty="0">
+                    <a:latin typeface="Fira Code" panose="020B0809050000020004" pitchFamily="49" charset="0"/>
+                    <a:ea typeface="Fira Code" panose="020B0809050000020004" pitchFamily="49" charset="0"/>
+                    <a:cs typeface="Fira Code" panose="020B0809050000020004" pitchFamily="49" charset="0"/>
+                  </a:rPr>
+                  <a:t>05:00</a:t>
+                </a:r>
+              </a:p>
+            </p:txBody>
+          </p:sp>
+        </p:grpSp>
+      </p:grpSp>
     </p:spTree>
     <p:extLst>
       <p:ext uri="{BB962C8B-B14F-4D97-AF65-F5344CB8AC3E}">
@@ -12264,6 +12641,63 @@
           </a:prstGeom>
         </p:spPr>
       </p:pic>
+      <p:sp>
+        <p:nvSpPr>
+          <p:cNvPr id="3" name="Rectangle: Rounded Corners 2">
+            <a:extLst>
+              <a:ext uri="{FF2B5EF4-FFF2-40B4-BE49-F238E27FC236}">
+                <a16:creationId xmlns:a16="http://schemas.microsoft.com/office/drawing/2014/main" id="{7E6DD3ED-407F-4286-B13F-CF54A70CFB2B}"/>
+              </a:ext>
+            </a:extLst>
+          </p:cNvPr>
+          <p:cNvSpPr/>
+          <p:nvPr/>
+        </p:nvSpPr>
+        <p:spPr>
+          <a:xfrm>
+            <a:off x="476791" y="5339644"/>
+            <a:ext cx="2334142" cy="1230488"/>
+          </a:xfrm>
+          <a:prstGeom prst="roundRect">
+            <a:avLst/>
+          </a:prstGeom>
+        </p:spPr>
+        <p:style>
+          <a:lnRef idx="2">
+            <a:schemeClr val="accent3">
+              <a:shade val="50000"/>
+            </a:schemeClr>
+          </a:lnRef>
+          <a:fillRef idx="1">
+            <a:schemeClr val="accent3"/>
+          </a:fillRef>
+          <a:effectRef idx="0">
+            <a:schemeClr val="accent3"/>
+          </a:effectRef>
+          <a:fontRef idx="minor">
+            <a:schemeClr val="lt1"/>
+          </a:fontRef>
+        </p:style>
+        <p:txBody>
+          <a:bodyPr rtlCol="0" anchor="ctr"/>
+          <a:lstStyle/>
+          <a:p>
+            <a:pPr algn="ctr"/>
+            <a:r>
+              <a:rPr lang="en-US" dirty="0"/>
+              <a:t>You can also find the supported aesthetics by visiting the ?help for each </a:t>
+            </a:r>
+            <a:r>
+              <a:rPr lang="en-US" dirty="0" err="1"/>
+              <a:t>geom</a:t>
+            </a:r>
+            <a:r>
+              <a:rPr lang="en-US" dirty="0"/>
+              <a:t>!</a:t>
+            </a:r>
+          </a:p>
+        </p:txBody>
+      </p:sp>
     </p:spTree>
     <p:extLst>
       <p:ext uri="{BB962C8B-B14F-4D97-AF65-F5344CB8AC3E}">
@@ -12274,6 +12708,84 @@
   <p:clrMapOvr>
     <a:masterClrMapping/>
   </p:clrMapOvr>
+  <p:timing>
+    <p:tnLst>
+      <p:par>
+        <p:cTn id="1" dur="indefinite" restart="never" nodeType="tmRoot">
+          <p:childTnLst>
+            <p:seq concurrent="1" nextAc="seek">
+              <p:cTn id="2" dur="indefinite" nodeType="mainSeq">
+                <p:childTnLst>
+                  <p:par>
+                    <p:cTn id="3" fill="hold">
+                      <p:stCondLst>
+                        <p:cond delay="indefinite"/>
+                      </p:stCondLst>
+                      <p:childTnLst>
+                        <p:par>
+                          <p:cTn id="4" fill="hold">
+                            <p:stCondLst>
+                              <p:cond delay="0"/>
+                            </p:stCondLst>
+                            <p:childTnLst>
+                              <p:par>
+                                <p:cTn id="5" presetID="1" presetClass="entr" presetSubtype="0" fill="hold" grpId="0" nodeType="clickEffect">
+                                  <p:stCondLst>
+                                    <p:cond delay="0"/>
+                                  </p:stCondLst>
+                                  <p:childTnLst>
+                                    <p:set>
+                                      <p:cBhvr>
+                                        <p:cTn id="6" dur="1" fill="hold">
+                                          <p:stCondLst>
+                                            <p:cond delay="0"/>
+                                          </p:stCondLst>
+                                        </p:cTn>
+                                        <p:tgtEl>
+                                          <p:spTgt spid="3"/>
+                                        </p:tgtEl>
+                                        <p:attrNameLst>
+                                          <p:attrName>style.visibility</p:attrName>
+                                        </p:attrNameLst>
+                                      </p:cBhvr>
+                                      <p:to>
+                                        <p:strVal val="visible"/>
+                                      </p:to>
+                                    </p:set>
+                                  </p:childTnLst>
+                                </p:cTn>
+                              </p:par>
+                            </p:childTnLst>
+                          </p:cTn>
+                        </p:par>
+                      </p:childTnLst>
+                    </p:cTn>
+                  </p:par>
+                </p:childTnLst>
+              </p:cTn>
+              <p:prevCondLst>
+                <p:cond evt="onPrev" delay="0">
+                  <p:tgtEl>
+                    <p:sldTgt/>
+                  </p:tgtEl>
+                </p:cond>
+              </p:prevCondLst>
+              <p:nextCondLst>
+                <p:cond evt="onNext" delay="0">
+                  <p:tgtEl>
+                    <p:sldTgt/>
+                  </p:tgtEl>
+                </p:cond>
+              </p:nextCondLst>
+            </p:seq>
+          </p:childTnLst>
+        </p:cTn>
+      </p:par>
+    </p:tnLst>
+    <p:bldLst>
+      <p:bldP spid="3" grpId="0" animBg="1"/>
+    </p:bldLst>
+  </p:timing>
 </p:sld>
 </file>
 
@@ -12470,8 +12982,8 @@
         </p:blipFill>
         <p:spPr bwMode="auto">
           <a:xfrm>
-            <a:off x="2541009" y="2336784"/>
-            <a:ext cx="7109982" cy="4384691"/>
+            <a:off x="1500618" y="2463057"/>
+            <a:ext cx="7109982" cy="3556016"/>
           </a:xfrm>
           <a:prstGeom prst="rect">
             <a:avLst/>
@@ -12488,6 +13000,184 @@
           </a:extLst>
         </p:spPr>
       </p:pic>
+      <p:grpSp>
+        <p:nvGrpSpPr>
+          <p:cNvPr id="7" name="Group 6">
+            <a:extLst>
+              <a:ext uri="{FF2B5EF4-FFF2-40B4-BE49-F238E27FC236}">
+                <a16:creationId xmlns:a16="http://schemas.microsoft.com/office/drawing/2014/main" id="{C6161DB8-BD2E-41A0-B7A3-9AC2428F1960}"/>
+              </a:ext>
+            </a:extLst>
+          </p:cNvPr>
+          <p:cNvGrpSpPr/>
+          <p:nvPr/>
+        </p:nvGrpSpPr>
+        <p:grpSpPr>
+          <a:xfrm>
+            <a:off x="9064978" y="5441950"/>
+            <a:ext cx="2813307" cy="914400"/>
+            <a:chOff x="9064978" y="5441950"/>
+            <a:chExt cx="2813307" cy="914400"/>
+          </a:xfrm>
+        </p:grpSpPr>
+        <p:sp>
+          <p:nvSpPr>
+            <p:cNvPr id="8" name="Rectangle 7">
+              <a:extLst>
+                <a:ext uri="{FF2B5EF4-FFF2-40B4-BE49-F238E27FC236}">
+                  <a16:creationId xmlns:a16="http://schemas.microsoft.com/office/drawing/2014/main" id="{81EEBD4F-FFBC-4A9E-A031-288C8A12070C}"/>
+                </a:ext>
+              </a:extLst>
+            </p:cNvPr>
+            <p:cNvSpPr/>
+            <p:nvPr/>
+          </p:nvSpPr>
+          <p:spPr>
+            <a:xfrm>
+              <a:off x="9064978" y="5441950"/>
+              <a:ext cx="2813307" cy="914400"/>
+            </a:xfrm>
+            <a:prstGeom prst="rect">
+              <a:avLst/>
+            </a:prstGeom>
+            <a:solidFill>
+              <a:schemeClr val="bg1">
+                <a:lumMod val="95000"/>
+              </a:schemeClr>
+            </a:solidFill>
+            <a:ln>
+              <a:solidFill>
+                <a:schemeClr val="bg1">
+                  <a:lumMod val="65000"/>
+                </a:schemeClr>
+              </a:solidFill>
+            </a:ln>
+          </p:spPr>
+          <p:style>
+            <a:lnRef idx="2">
+              <a:schemeClr val="accent1">
+                <a:shade val="50000"/>
+              </a:schemeClr>
+            </a:lnRef>
+            <a:fillRef idx="1">
+              <a:schemeClr val="accent1"/>
+            </a:fillRef>
+            <a:effectRef idx="0">
+              <a:schemeClr val="accent1"/>
+            </a:effectRef>
+            <a:fontRef idx="minor">
+              <a:schemeClr val="lt1"/>
+            </a:fontRef>
+          </p:style>
+          <p:txBody>
+            <a:bodyPr rtlCol="0" anchor="ctr"/>
+            <a:lstStyle/>
+            <a:p>
+              <a:pPr algn="ctr"/>
+              <a:endParaRPr lang="en-US"/>
+            </a:p>
+          </p:txBody>
+        </p:sp>
+        <p:grpSp>
+          <p:nvGrpSpPr>
+            <p:cNvPr id="9" name="Group 8">
+              <a:extLst>
+                <a:ext uri="{FF2B5EF4-FFF2-40B4-BE49-F238E27FC236}">
+                  <a16:creationId xmlns:a16="http://schemas.microsoft.com/office/drawing/2014/main" id="{44735586-7E64-487F-A9BE-1693AC98FD68}"/>
+                </a:ext>
+              </a:extLst>
+            </p:cNvPr>
+            <p:cNvGrpSpPr/>
+            <p:nvPr/>
+          </p:nvGrpSpPr>
+          <p:grpSpPr>
+            <a:xfrm>
+              <a:off x="9164782" y="5441950"/>
+              <a:ext cx="2713503" cy="914400"/>
+              <a:chOff x="9164782" y="5441950"/>
+              <a:chExt cx="2713503" cy="914400"/>
+            </a:xfrm>
+          </p:grpSpPr>
+          <p:pic>
+            <p:nvPicPr>
+              <p:cNvPr id="10" name="Graphic 9" descr="Stopwatch">
+                <a:extLst>
+                  <a:ext uri="{FF2B5EF4-FFF2-40B4-BE49-F238E27FC236}">
+                    <a16:creationId xmlns:a16="http://schemas.microsoft.com/office/drawing/2014/main" id="{3EDBE068-11A6-4E08-8C6B-ACF01529FD87}"/>
+                  </a:ext>
+                </a:extLst>
+              </p:cNvPr>
+              <p:cNvPicPr>
+                <a:picLocks noChangeAspect="1"/>
+              </p:cNvPicPr>
+              <p:nvPr/>
+            </p:nvPicPr>
+            <p:blipFill>
+              <a:blip r:embed="rId3">
+                <a:extLst>
+                  <a:ext uri="{28A0092B-C50C-407E-A947-70E740481C1C}">
+                    <a14:useLocalDpi xmlns:a14="http://schemas.microsoft.com/office/drawing/2010/main" val="0"/>
+                  </a:ext>
+                  <a:ext uri="{96DAC541-7B7A-43D3-8B79-37D633B846F1}">
+                    <asvg:svgBlip xmlns:asvg="http://schemas.microsoft.com/office/drawing/2016/SVG/main" r:embed="rId4"/>
+                  </a:ext>
+                </a:extLst>
+              </a:blip>
+              <a:stretch>
+                <a:fillRect/>
+              </a:stretch>
+            </p:blipFill>
+            <p:spPr>
+              <a:xfrm>
+                <a:off x="9164782" y="5441950"/>
+                <a:ext cx="914400" cy="914400"/>
+              </a:xfrm>
+              <a:prstGeom prst="rect">
+                <a:avLst/>
+              </a:prstGeom>
+            </p:spPr>
+          </p:pic>
+          <p:sp>
+            <p:nvSpPr>
+              <p:cNvPr id="11" name="TextBox 10">
+                <a:extLst>
+                  <a:ext uri="{FF2B5EF4-FFF2-40B4-BE49-F238E27FC236}">
+                    <a16:creationId xmlns:a16="http://schemas.microsoft.com/office/drawing/2014/main" id="{64F8C129-48A4-471A-AA04-3B3F384710E3}"/>
+                  </a:ext>
+                </a:extLst>
+              </p:cNvPr>
+              <p:cNvSpPr txBox="1"/>
+              <p:nvPr/>
+            </p:nvSpPr>
+            <p:spPr>
+              <a:xfrm>
+                <a:off x="9958853" y="5586909"/>
+                <a:ext cx="1919432" cy="769441"/>
+              </a:xfrm>
+              <a:prstGeom prst="rect">
+                <a:avLst/>
+              </a:prstGeom>
+              <a:noFill/>
+            </p:spPr>
+            <p:txBody>
+              <a:bodyPr wrap="square" rtlCol="0">
+                <a:spAutoFit/>
+              </a:bodyPr>
+              <a:lstStyle/>
+              <a:p>
+                <a:r>
+                  <a:rPr lang="en-US" sz="4400" dirty="0">
+                    <a:latin typeface="Fira Code" panose="020B0809050000020004" pitchFamily="49" charset="0"/>
+                    <a:ea typeface="Fira Code" panose="020B0809050000020004" pitchFamily="49" charset="0"/>
+                    <a:cs typeface="Fira Code" panose="020B0809050000020004" pitchFamily="49" charset="0"/>
+                  </a:rPr>
+                  <a:t>02:00</a:t>
+                </a:r>
+              </a:p>
+            </p:txBody>
+          </p:sp>
+        </p:grpSp>
+      </p:grpSp>
     </p:spTree>
     <p:extLst>
       <p:ext uri="{BB962C8B-B14F-4D97-AF65-F5344CB8AC3E}">
@@ -13309,6 +13999,11 @@
             </a:r>
             <a:r>
               <a:rPr lang="en-US" dirty="0">
+                <a:solidFill>
+                  <a:schemeClr val="accent6">
+                    <a:lumMod val="75000"/>
+                  </a:schemeClr>
+                </a:solidFill>
                 <a:latin typeface="Fira Code" panose="020B0809050000020004" pitchFamily="49" charset="0"/>
                 <a:ea typeface="Fira Code" panose="020B0809050000020004" pitchFamily="49" charset="0"/>
                 <a:cs typeface="Fira Code" panose="020B0809050000020004" pitchFamily="49" charset="0"/>
@@ -13348,6 +14043,11 @@
             </a:r>
             <a:r>
               <a:rPr lang="en-US" dirty="0">
+                <a:solidFill>
+                  <a:schemeClr val="accent6">
+                    <a:lumMod val="75000"/>
+                  </a:schemeClr>
+                </a:solidFill>
                 <a:latin typeface="Fira Code" panose="020B0809050000020004" pitchFamily="49" charset="0"/>
                 <a:ea typeface="Fira Code" panose="020B0809050000020004" pitchFamily="49" charset="0"/>
                 <a:cs typeface="Fira Code" panose="020B0809050000020004" pitchFamily="49" charset="0"/>
@@ -13360,6 +14060,11 @@
             </a:r>
             <a:r>
               <a:rPr lang="en-US" dirty="0">
+                <a:solidFill>
+                  <a:schemeClr val="accent6">
+                    <a:lumMod val="75000"/>
+                  </a:schemeClr>
+                </a:solidFill>
                 <a:latin typeface="Fira Code" panose="020B0809050000020004" pitchFamily="49" charset="0"/>
                 <a:ea typeface="Fira Code" panose="020B0809050000020004" pitchFamily="49" charset="0"/>
                 <a:cs typeface="Fira Code" panose="020B0809050000020004" pitchFamily="49" charset="0"/>
@@ -13438,6 +14143,184 @@
           </a:p>
         </p:txBody>
       </p:sp>
+      <p:grpSp>
+        <p:nvGrpSpPr>
+          <p:cNvPr id="6" name="Group 5">
+            <a:extLst>
+              <a:ext uri="{FF2B5EF4-FFF2-40B4-BE49-F238E27FC236}">
+                <a16:creationId xmlns:a16="http://schemas.microsoft.com/office/drawing/2014/main" id="{C9B786A9-F381-4E0A-9CF5-E6DC92A325F3}"/>
+              </a:ext>
+            </a:extLst>
+          </p:cNvPr>
+          <p:cNvGrpSpPr/>
+          <p:nvPr/>
+        </p:nvGrpSpPr>
+        <p:grpSpPr>
+          <a:xfrm>
+            <a:off x="9064978" y="5441950"/>
+            <a:ext cx="2813307" cy="914400"/>
+            <a:chOff x="9064978" y="5441950"/>
+            <a:chExt cx="2813307" cy="914400"/>
+          </a:xfrm>
+        </p:grpSpPr>
+        <p:sp>
+          <p:nvSpPr>
+            <p:cNvPr id="7" name="Rectangle 6">
+              <a:extLst>
+                <a:ext uri="{FF2B5EF4-FFF2-40B4-BE49-F238E27FC236}">
+                  <a16:creationId xmlns:a16="http://schemas.microsoft.com/office/drawing/2014/main" id="{271DEBF4-432E-416A-B856-01423483E8C0}"/>
+                </a:ext>
+              </a:extLst>
+            </p:cNvPr>
+            <p:cNvSpPr/>
+            <p:nvPr/>
+          </p:nvSpPr>
+          <p:spPr>
+            <a:xfrm>
+              <a:off x="9064978" y="5441950"/>
+              <a:ext cx="2813307" cy="914400"/>
+            </a:xfrm>
+            <a:prstGeom prst="rect">
+              <a:avLst/>
+            </a:prstGeom>
+            <a:solidFill>
+              <a:schemeClr val="bg1">
+                <a:lumMod val="95000"/>
+              </a:schemeClr>
+            </a:solidFill>
+            <a:ln>
+              <a:solidFill>
+                <a:schemeClr val="bg1">
+                  <a:lumMod val="65000"/>
+                </a:schemeClr>
+              </a:solidFill>
+            </a:ln>
+          </p:spPr>
+          <p:style>
+            <a:lnRef idx="2">
+              <a:schemeClr val="accent1">
+                <a:shade val="50000"/>
+              </a:schemeClr>
+            </a:lnRef>
+            <a:fillRef idx="1">
+              <a:schemeClr val="accent1"/>
+            </a:fillRef>
+            <a:effectRef idx="0">
+              <a:schemeClr val="accent1"/>
+            </a:effectRef>
+            <a:fontRef idx="minor">
+              <a:schemeClr val="lt1"/>
+            </a:fontRef>
+          </p:style>
+          <p:txBody>
+            <a:bodyPr rtlCol="0" anchor="ctr"/>
+            <a:lstStyle/>
+            <a:p>
+              <a:pPr algn="ctr"/>
+              <a:endParaRPr lang="en-US"/>
+            </a:p>
+          </p:txBody>
+        </p:sp>
+        <p:grpSp>
+          <p:nvGrpSpPr>
+            <p:cNvPr id="8" name="Group 7">
+              <a:extLst>
+                <a:ext uri="{FF2B5EF4-FFF2-40B4-BE49-F238E27FC236}">
+                  <a16:creationId xmlns:a16="http://schemas.microsoft.com/office/drawing/2014/main" id="{E1996AC3-E755-432C-A39A-44CF6B465A07}"/>
+                </a:ext>
+              </a:extLst>
+            </p:cNvPr>
+            <p:cNvGrpSpPr/>
+            <p:nvPr/>
+          </p:nvGrpSpPr>
+          <p:grpSpPr>
+            <a:xfrm>
+              <a:off x="9164782" y="5441950"/>
+              <a:ext cx="2713503" cy="914400"/>
+              <a:chOff x="9164782" y="5441950"/>
+              <a:chExt cx="2713503" cy="914400"/>
+            </a:xfrm>
+          </p:grpSpPr>
+          <p:pic>
+            <p:nvPicPr>
+              <p:cNvPr id="9" name="Graphic 8" descr="Stopwatch">
+                <a:extLst>
+                  <a:ext uri="{FF2B5EF4-FFF2-40B4-BE49-F238E27FC236}">
+                    <a16:creationId xmlns:a16="http://schemas.microsoft.com/office/drawing/2014/main" id="{F8791A61-4727-4A0B-A2EA-7D00ACD17674}"/>
+                  </a:ext>
+                </a:extLst>
+              </p:cNvPr>
+              <p:cNvPicPr>
+                <a:picLocks noChangeAspect="1"/>
+              </p:cNvPicPr>
+              <p:nvPr/>
+            </p:nvPicPr>
+            <p:blipFill>
+              <a:blip r:embed="rId2">
+                <a:extLst>
+                  <a:ext uri="{28A0092B-C50C-407E-A947-70E740481C1C}">
+                    <a14:useLocalDpi xmlns:a14="http://schemas.microsoft.com/office/drawing/2010/main" val="0"/>
+                  </a:ext>
+                  <a:ext uri="{96DAC541-7B7A-43D3-8B79-37D633B846F1}">
+                    <asvg:svgBlip xmlns:asvg="http://schemas.microsoft.com/office/drawing/2016/SVG/main" r:embed="rId3"/>
+                  </a:ext>
+                </a:extLst>
+              </a:blip>
+              <a:stretch>
+                <a:fillRect/>
+              </a:stretch>
+            </p:blipFill>
+            <p:spPr>
+              <a:xfrm>
+                <a:off x="9164782" y="5441950"/>
+                <a:ext cx="914400" cy="914400"/>
+              </a:xfrm>
+              <a:prstGeom prst="rect">
+                <a:avLst/>
+              </a:prstGeom>
+            </p:spPr>
+          </p:pic>
+          <p:sp>
+            <p:nvSpPr>
+              <p:cNvPr id="10" name="TextBox 9">
+                <a:extLst>
+                  <a:ext uri="{FF2B5EF4-FFF2-40B4-BE49-F238E27FC236}">
+                    <a16:creationId xmlns:a16="http://schemas.microsoft.com/office/drawing/2014/main" id="{04F9E654-4C0D-4BF7-A32F-22A88A681866}"/>
+                  </a:ext>
+                </a:extLst>
+              </p:cNvPr>
+              <p:cNvSpPr txBox="1"/>
+              <p:nvPr/>
+            </p:nvSpPr>
+            <p:spPr>
+              <a:xfrm>
+                <a:off x="9958853" y="5586909"/>
+                <a:ext cx="1919432" cy="769441"/>
+              </a:xfrm>
+              <a:prstGeom prst="rect">
+                <a:avLst/>
+              </a:prstGeom>
+              <a:noFill/>
+            </p:spPr>
+            <p:txBody>
+              <a:bodyPr wrap="square" rtlCol="0">
+                <a:spAutoFit/>
+              </a:bodyPr>
+              <a:lstStyle/>
+              <a:p>
+                <a:r>
+                  <a:rPr lang="en-US" sz="4400" dirty="0">
+                    <a:latin typeface="Fira Code" panose="020B0809050000020004" pitchFamily="49" charset="0"/>
+                    <a:ea typeface="Fira Code" panose="020B0809050000020004" pitchFamily="49" charset="0"/>
+                    <a:cs typeface="Fira Code" panose="020B0809050000020004" pitchFamily="49" charset="0"/>
+                  </a:rPr>
+                  <a:t>02:00</a:t>
+                </a:r>
+              </a:p>
+            </p:txBody>
+          </p:sp>
+        </p:grpSp>
+      </p:grpSp>
     </p:spTree>
     <p:extLst>
       <p:ext uri="{BB962C8B-B14F-4D97-AF65-F5344CB8AC3E}">
@@ -16357,6 +17240,184 @@
           </a:p>
         </p:txBody>
       </p:sp>
+      <p:grpSp>
+        <p:nvGrpSpPr>
+          <p:cNvPr id="8" name="Group 7">
+            <a:extLst>
+              <a:ext uri="{FF2B5EF4-FFF2-40B4-BE49-F238E27FC236}">
+                <a16:creationId xmlns:a16="http://schemas.microsoft.com/office/drawing/2014/main" id="{71796719-A8D4-4CF2-8371-AFA984612225}"/>
+              </a:ext>
+            </a:extLst>
+          </p:cNvPr>
+          <p:cNvGrpSpPr/>
+          <p:nvPr/>
+        </p:nvGrpSpPr>
+        <p:grpSpPr>
+          <a:xfrm>
+            <a:off x="9064978" y="5441950"/>
+            <a:ext cx="2813307" cy="914400"/>
+            <a:chOff x="9064978" y="5441950"/>
+            <a:chExt cx="2813307" cy="914400"/>
+          </a:xfrm>
+        </p:grpSpPr>
+        <p:sp>
+          <p:nvSpPr>
+            <p:cNvPr id="9" name="Rectangle 8">
+              <a:extLst>
+                <a:ext uri="{FF2B5EF4-FFF2-40B4-BE49-F238E27FC236}">
+                  <a16:creationId xmlns:a16="http://schemas.microsoft.com/office/drawing/2014/main" id="{B1181044-1325-4723-AA67-ED82D5627BDB}"/>
+                </a:ext>
+              </a:extLst>
+            </p:cNvPr>
+            <p:cNvSpPr/>
+            <p:nvPr/>
+          </p:nvSpPr>
+          <p:spPr>
+            <a:xfrm>
+              <a:off x="9064978" y="5441950"/>
+              <a:ext cx="2813307" cy="914400"/>
+            </a:xfrm>
+            <a:prstGeom prst="rect">
+              <a:avLst/>
+            </a:prstGeom>
+            <a:solidFill>
+              <a:schemeClr val="bg1">
+                <a:lumMod val="95000"/>
+              </a:schemeClr>
+            </a:solidFill>
+            <a:ln>
+              <a:solidFill>
+                <a:schemeClr val="bg1">
+                  <a:lumMod val="65000"/>
+                </a:schemeClr>
+              </a:solidFill>
+            </a:ln>
+          </p:spPr>
+          <p:style>
+            <a:lnRef idx="2">
+              <a:schemeClr val="accent1">
+                <a:shade val="50000"/>
+              </a:schemeClr>
+            </a:lnRef>
+            <a:fillRef idx="1">
+              <a:schemeClr val="accent1"/>
+            </a:fillRef>
+            <a:effectRef idx="0">
+              <a:schemeClr val="accent1"/>
+            </a:effectRef>
+            <a:fontRef idx="minor">
+              <a:schemeClr val="lt1"/>
+            </a:fontRef>
+          </p:style>
+          <p:txBody>
+            <a:bodyPr rtlCol="0" anchor="ctr"/>
+            <a:lstStyle/>
+            <a:p>
+              <a:pPr algn="ctr"/>
+              <a:endParaRPr lang="en-US"/>
+            </a:p>
+          </p:txBody>
+        </p:sp>
+        <p:grpSp>
+          <p:nvGrpSpPr>
+            <p:cNvPr id="10" name="Group 9">
+              <a:extLst>
+                <a:ext uri="{FF2B5EF4-FFF2-40B4-BE49-F238E27FC236}">
+                  <a16:creationId xmlns:a16="http://schemas.microsoft.com/office/drawing/2014/main" id="{2C257FFA-4228-4864-987C-DC52BF348F14}"/>
+                </a:ext>
+              </a:extLst>
+            </p:cNvPr>
+            <p:cNvGrpSpPr/>
+            <p:nvPr/>
+          </p:nvGrpSpPr>
+          <p:grpSpPr>
+            <a:xfrm>
+              <a:off x="9164782" y="5441950"/>
+              <a:ext cx="2713503" cy="914400"/>
+              <a:chOff x="9164782" y="5441950"/>
+              <a:chExt cx="2713503" cy="914400"/>
+            </a:xfrm>
+          </p:grpSpPr>
+          <p:pic>
+            <p:nvPicPr>
+              <p:cNvPr id="11" name="Graphic 10" descr="Stopwatch">
+                <a:extLst>
+                  <a:ext uri="{FF2B5EF4-FFF2-40B4-BE49-F238E27FC236}">
+                    <a16:creationId xmlns:a16="http://schemas.microsoft.com/office/drawing/2014/main" id="{49EF52D0-5940-4D99-BC0F-4730F24BCF83}"/>
+                  </a:ext>
+                </a:extLst>
+              </p:cNvPr>
+              <p:cNvPicPr>
+                <a:picLocks noChangeAspect="1"/>
+              </p:cNvPicPr>
+              <p:nvPr/>
+            </p:nvPicPr>
+            <p:blipFill>
+              <a:blip r:embed="rId2">
+                <a:extLst>
+                  <a:ext uri="{28A0092B-C50C-407E-A947-70E740481C1C}">
+                    <a14:useLocalDpi xmlns:a14="http://schemas.microsoft.com/office/drawing/2010/main" val="0"/>
+                  </a:ext>
+                  <a:ext uri="{96DAC541-7B7A-43D3-8B79-37D633B846F1}">
+                    <asvg:svgBlip xmlns:asvg="http://schemas.microsoft.com/office/drawing/2016/SVG/main" r:embed="rId3"/>
+                  </a:ext>
+                </a:extLst>
+              </a:blip>
+              <a:stretch>
+                <a:fillRect/>
+              </a:stretch>
+            </p:blipFill>
+            <p:spPr>
+              <a:xfrm>
+                <a:off x="9164782" y="5441950"/>
+                <a:ext cx="914400" cy="914400"/>
+              </a:xfrm>
+              <a:prstGeom prst="rect">
+                <a:avLst/>
+              </a:prstGeom>
+            </p:spPr>
+          </p:pic>
+          <p:sp>
+            <p:nvSpPr>
+              <p:cNvPr id="12" name="TextBox 11">
+                <a:extLst>
+                  <a:ext uri="{FF2B5EF4-FFF2-40B4-BE49-F238E27FC236}">
+                    <a16:creationId xmlns:a16="http://schemas.microsoft.com/office/drawing/2014/main" id="{81F601AC-9EF4-4701-B09F-14024BE67120}"/>
+                  </a:ext>
+                </a:extLst>
+              </p:cNvPr>
+              <p:cNvSpPr txBox="1"/>
+              <p:nvPr/>
+            </p:nvSpPr>
+            <p:spPr>
+              <a:xfrm>
+                <a:off x="9958853" y="5586909"/>
+                <a:ext cx="1919432" cy="769441"/>
+              </a:xfrm>
+              <a:prstGeom prst="rect">
+                <a:avLst/>
+              </a:prstGeom>
+              <a:noFill/>
+            </p:spPr>
+            <p:txBody>
+              <a:bodyPr wrap="square" rtlCol="0">
+                <a:spAutoFit/>
+              </a:bodyPr>
+              <a:lstStyle/>
+              <a:p>
+                <a:r>
+                  <a:rPr lang="en-US" sz="4400" dirty="0">
+                    <a:latin typeface="Fira Code" panose="020B0809050000020004" pitchFamily="49" charset="0"/>
+                    <a:ea typeface="Fira Code" panose="020B0809050000020004" pitchFamily="49" charset="0"/>
+                    <a:cs typeface="Fira Code" panose="020B0809050000020004" pitchFamily="49" charset="0"/>
+                  </a:rPr>
+                  <a:t>01:00</a:t>
+                </a:r>
+              </a:p>
+            </p:txBody>
+          </p:sp>
+        </p:grpSp>
+      </p:grpSp>
     </p:spTree>
     <p:extLst>
       <p:ext uri="{BB962C8B-B14F-4D97-AF65-F5344CB8AC3E}">
@@ -16525,7 +17586,28 @@
                 <a:ea typeface="Fira Code" panose="020B0809050000020004" pitchFamily="49" charset="0"/>
                 <a:cs typeface="Fira Code" panose="020B0809050000020004" pitchFamily="49" charset="0"/>
               </a:rPr>
-              <a:t> (x = cut, fill = clarity))</a:t>
+              <a:t> (x = cut, </a:t>
+            </a:r>
+            <a:r>
+              <a:rPr lang="en-US" sz="2400" dirty="0">
+                <a:solidFill>
+                  <a:schemeClr val="accent6">
+                    <a:lumMod val="75000"/>
+                  </a:schemeClr>
+                </a:solidFill>
+                <a:latin typeface="Fira Code" panose="020B0809050000020004" pitchFamily="49" charset="0"/>
+                <a:ea typeface="Fira Code" panose="020B0809050000020004" pitchFamily="49" charset="0"/>
+                <a:cs typeface="Fira Code" panose="020B0809050000020004" pitchFamily="49" charset="0"/>
+              </a:rPr>
+              <a:t>fill = clarity</a:t>
+            </a:r>
+            <a:r>
+              <a:rPr lang="en-US" sz="2400" dirty="0">
+                <a:latin typeface="Fira Code" panose="020B0809050000020004" pitchFamily="49" charset="0"/>
+                <a:ea typeface="Fira Code" panose="020B0809050000020004" pitchFamily="49" charset="0"/>
+                <a:cs typeface="Fira Code" panose="020B0809050000020004" pitchFamily="49" charset="0"/>
+              </a:rPr>
+              <a:t>))</a:t>
             </a:r>
           </a:p>
         </p:txBody>
@@ -17729,6 +18811,184 @@
           </a:p>
         </p:txBody>
       </p:sp>
+      <p:grpSp>
+        <p:nvGrpSpPr>
+          <p:cNvPr id="7" name="Group 6">
+            <a:extLst>
+              <a:ext uri="{FF2B5EF4-FFF2-40B4-BE49-F238E27FC236}">
+                <a16:creationId xmlns:a16="http://schemas.microsoft.com/office/drawing/2014/main" id="{7993A13C-9555-4EA2-A2E9-8744CD1736BB}"/>
+              </a:ext>
+            </a:extLst>
+          </p:cNvPr>
+          <p:cNvGrpSpPr/>
+          <p:nvPr/>
+        </p:nvGrpSpPr>
+        <p:grpSpPr>
+          <a:xfrm>
+            <a:off x="9064978" y="5441950"/>
+            <a:ext cx="2813307" cy="914400"/>
+            <a:chOff x="9064978" y="5441950"/>
+            <a:chExt cx="2813307" cy="914400"/>
+          </a:xfrm>
+        </p:grpSpPr>
+        <p:sp>
+          <p:nvSpPr>
+            <p:cNvPr id="8" name="Rectangle 7">
+              <a:extLst>
+                <a:ext uri="{FF2B5EF4-FFF2-40B4-BE49-F238E27FC236}">
+                  <a16:creationId xmlns:a16="http://schemas.microsoft.com/office/drawing/2014/main" id="{67725025-D5CF-4095-A189-FFB7243B8771}"/>
+                </a:ext>
+              </a:extLst>
+            </p:cNvPr>
+            <p:cNvSpPr/>
+            <p:nvPr/>
+          </p:nvSpPr>
+          <p:spPr>
+            <a:xfrm>
+              <a:off x="9064978" y="5441950"/>
+              <a:ext cx="2813307" cy="914400"/>
+            </a:xfrm>
+            <a:prstGeom prst="rect">
+              <a:avLst/>
+            </a:prstGeom>
+            <a:solidFill>
+              <a:schemeClr val="bg1">
+                <a:lumMod val="95000"/>
+              </a:schemeClr>
+            </a:solidFill>
+            <a:ln>
+              <a:solidFill>
+                <a:schemeClr val="bg1">
+                  <a:lumMod val="65000"/>
+                </a:schemeClr>
+              </a:solidFill>
+            </a:ln>
+          </p:spPr>
+          <p:style>
+            <a:lnRef idx="2">
+              <a:schemeClr val="accent1">
+                <a:shade val="50000"/>
+              </a:schemeClr>
+            </a:lnRef>
+            <a:fillRef idx="1">
+              <a:schemeClr val="accent1"/>
+            </a:fillRef>
+            <a:effectRef idx="0">
+              <a:schemeClr val="accent1"/>
+            </a:effectRef>
+            <a:fontRef idx="minor">
+              <a:schemeClr val="lt1"/>
+            </a:fontRef>
+          </p:style>
+          <p:txBody>
+            <a:bodyPr rtlCol="0" anchor="ctr"/>
+            <a:lstStyle/>
+            <a:p>
+              <a:pPr algn="ctr"/>
+              <a:endParaRPr lang="en-US"/>
+            </a:p>
+          </p:txBody>
+        </p:sp>
+        <p:grpSp>
+          <p:nvGrpSpPr>
+            <p:cNvPr id="9" name="Group 8">
+              <a:extLst>
+                <a:ext uri="{FF2B5EF4-FFF2-40B4-BE49-F238E27FC236}">
+                  <a16:creationId xmlns:a16="http://schemas.microsoft.com/office/drawing/2014/main" id="{8376E7F7-DF4D-45A6-8DBF-6B3C94979305}"/>
+                </a:ext>
+              </a:extLst>
+            </p:cNvPr>
+            <p:cNvGrpSpPr/>
+            <p:nvPr/>
+          </p:nvGrpSpPr>
+          <p:grpSpPr>
+            <a:xfrm>
+              <a:off x="9164782" y="5441950"/>
+              <a:ext cx="2713503" cy="914400"/>
+              <a:chOff x="9164782" y="5441950"/>
+              <a:chExt cx="2713503" cy="914400"/>
+            </a:xfrm>
+          </p:grpSpPr>
+          <p:pic>
+            <p:nvPicPr>
+              <p:cNvPr id="10" name="Graphic 9" descr="Stopwatch">
+                <a:extLst>
+                  <a:ext uri="{FF2B5EF4-FFF2-40B4-BE49-F238E27FC236}">
+                    <a16:creationId xmlns:a16="http://schemas.microsoft.com/office/drawing/2014/main" id="{179A714C-7BFA-4482-89F1-B4532FE2610D}"/>
+                  </a:ext>
+                </a:extLst>
+              </p:cNvPr>
+              <p:cNvPicPr>
+                <a:picLocks noChangeAspect="1"/>
+              </p:cNvPicPr>
+              <p:nvPr/>
+            </p:nvPicPr>
+            <p:blipFill>
+              <a:blip r:embed="rId2">
+                <a:extLst>
+                  <a:ext uri="{28A0092B-C50C-407E-A947-70E740481C1C}">
+                    <a14:useLocalDpi xmlns:a14="http://schemas.microsoft.com/office/drawing/2010/main" val="0"/>
+                  </a:ext>
+                  <a:ext uri="{96DAC541-7B7A-43D3-8B79-37D633B846F1}">
+                    <asvg:svgBlip xmlns:asvg="http://schemas.microsoft.com/office/drawing/2016/SVG/main" r:embed="rId3"/>
+                  </a:ext>
+                </a:extLst>
+              </a:blip>
+              <a:stretch>
+                <a:fillRect/>
+              </a:stretch>
+            </p:blipFill>
+            <p:spPr>
+              <a:xfrm>
+                <a:off x="9164782" y="5441950"/>
+                <a:ext cx="914400" cy="914400"/>
+              </a:xfrm>
+              <a:prstGeom prst="rect">
+                <a:avLst/>
+              </a:prstGeom>
+            </p:spPr>
+          </p:pic>
+          <p:sp>
+            <p:nvSpPr>
+              <p:cNvPr id="11" name="TextBox 10">
+                <a:extLst>
+                  <a:ext uri="{FF2B5EF4-FFF2-40B4-BE49-F238E27FC236}">
+                    <a16:creationId xmlns:a16="http://schemas.microsoft.com/office/drawing/2014/main" id="{E95AD60C-FCA1-48C8-A979-4CB19A371DDB}"/>
+                  </a:ext>
+                </a:extLst>
+              </p:cNvPr>
+              <p:cNvSpPr txBox="1"/>
+              <p:nvPr/>
+            </p:nvSpPr>
+            <p:spPr>
+              <a:xfrm>
+                <a:off x="9958853" y="5586909"/>
+                <a:ext cx="1919432" cy="769441"/>
+              </a:xfrm>
+              <a:prstGeom prst="rect">
+                <a:avLst/>
+              </a:prstGeom>
+              <a:noFill/>
+            </p:spPr>
+            <p:txBody>
+              <a:bodyPr wrap="square" rtlCol="0">
+                <a:spAutoFit/>
+              </a:bodyPr>
+              <a:lstStyle/>
+              <a:p>
+                <a:r>
+                  <a:rPr lang="en-US" sz="4400" dirty="0">
+                    <a:latin typeface="Fira Code" panose="020B0809050000020004" pitchFamily="49" charset="0"/>
+                    <a:ea typeface="Fira Code" panose="020B0809050000020004" pitchFamily="49" charset="0"/>
+                    <a:cs typeface="Fira Code" panose="020B0809050000020004" pitchFamily="49" charset="0"/>
+                  </a:rPr>
+                  <a:t>02:00</a:t>
+                </a:r>
+              </a:p>
+            </p:txBody>
+          </p:sp>
+        </p:grpSp>
+      </p:grpSp>
     </p:spTree>
     <p:extLst>
       <p:ext uri="{BB962C8B-B14F-4D97-AF65-F5344CB8AC3E}">
@@ -19703,10 +20963,31 @@
                 <a:ea typeface="Fira Code" panose="020B0809050000020004" pitchFamily="49" charset="0"/>
                 <a:cs typeface="Fira Code" panose="020B0809050000020004" pitchFamily="49" charset="0"/>
               </a:rPr>
-              <a:t>`head()`</a:t>
+              <a:t>`</a:t>
             </a:r>
             <a:r>
               <a:rPr lang="en-US" sz="2800" dirty="0">
+                <a:solidFill>
+                  <a:schemeClr val="accent6">
+                    <a:lumMod val="75000"/>
+                  </a:schemeClr>
+                </a:solidFill>
+                <a:latin typeface="Fira Code" panose="020B0809050000020004" pitchFamily="49" charset="0"/>
+                <a:ea typeface="Fira Code" panose="020B0809050000020004" pitchFamily="49" charset="0"/>
+                <a:cs typeface="Fira Code" panose="020B0809050000020004" pitchFamily="49" charset="0"/>
+              </a:rPr>
+              <a:t>head</a:t>
+            </a:r>
+            <a:r>
+              <a:rPr lang="en-US" sz="2800" dirty="0">
+                <a:latin typeface="Fira Code" panose="020B0809050000020004" pitchFamily="49" charset="0"/>
+                <a:ea typeface="Fira Code" panose="020B0809050000020004" pitchFamily="49" charset="0"/>
+                <a:cs typeface="Fira Code" panose="020B0809050000020004" pitchFamily="49" charset="0"/>
+              </a:rPr>
+              <a:t>()`</a:t>
+            </a:r>
+            <a:r>
+              <a:rPr lang="en-US" sz="2800" dirty="0">
                 <a:ea typeface="Fira Code" panose="020B0809050000020004" pitchFamily="49" charset="0"/>
                 <a:cs typeface="Fira Code" panose="020B0809050000020004" pitchFamily="49" charset="0"/>
               </a:rPr>
@@ -19718,10 +20999,31 @@
                 <a:ea typeface="Fira Code" panose="020B0809050000020004" pitchFamily="49" charset="0"/>
                 <a:cs typeface="Fira Code" panose="020B0809050000020004" pitchFamily="49" charset="0"/>
               </a:rPr>
-              <a:t> `tail()`</a:t>
+              <a:t> `</a:t>
             </a:r>
             <a:r>
               <a:rPr lang="en-US" sz="2800" dirty="0">
+                <a:solidFill>
+                  <a:schemeClr val="accent6">
+                    <a:lumMod val="75000"/>
+                  </a:schemeClr>
+                </a:solidFill>
+                <a:latin typeface="Fira Code" panose="020B0809050000020004" pitchFamily="49" charset="0"/>
+                <a:ea typeface="Fira Code" panose="020B0809050000020004" pitchFamily="49" charset="0"/>
+                <a:cs typeface="Fira Code" panose="020B0809050000020004" pitchFamily="49" charset="0"/>
+              </a:rPr>
+              <a:t>tail</a:t>
+            </a:r>
+            <a:r>
+              <a:rPr lang="en-US" sz="2800" dirty="0">
+                <a:latin typeface="Fira Code" panose="020B0809050000020004" pitchFamily="49" charset="0"/>
+                <a:ea typeface="Fira Code" panose="020B0809050000020004" pitchFamily="49" charset="0"/>
+                <a:cs typeface="Fira Code" panose="020B0809050000020004" pitchFamily="49" charset="0"/>
+              </a:rPr>
+              <a:t>()`</a:t>
+            </a:r>
+            <a:r>
+              <a:rPr lang="en-US" sz="2800" dirty="0">
                 <a:ea typeface="Fira Code" panose="020B0809050000020004" pitchFamily="49" charset="0"/>
                 <a:cs typeface="Fira Code" panose="020B0809050000020004" pitchFamily="49" charset="0"/>
               </a:rPr>
@@ -19733,7 +21035,28 @@
                 <a:ea typeface="Fira Code" panose="020B0809050000020004" pitchFamily="49" charset="0"/>
                 <a:cs typeface="Fira Code" panose="020B0809050000020004" pitchFamily="49" charset="0"/>
               </a:rPr>
-              <a:t> `str()`</a:t>
+              <a:t> `</a:t>
+            </a:r>
+            <a:r>
+              <a:rPr lang="en-US" sz="2800" dirty="0">
+                <a:solidFill>
+                  <a:schemeClr val="accent6">
+                    <a:lumMod val="75000"/>
+                  </a:schemeClr>
+                </a:solidFill>
+                <a:latin typeface="Fira Code" panose="020B0809050000020004" pitchFamily="49" charset="0"/>
+                <a:ea typeface="Fira Code" panose="020B0809050000020004" pitchFamily="49" charset="0"/>
+                <a:cs typeface="Fira Code" panose="020B0809050000020004" pitchFamily="49" charset="0"/>
+              </a:rPr>
+              <a:t>str</a:t>
+            </a:r>
+            <a:r>
+              <a:rPr lang="en-US" sz="2800" dirty="0">
+                <a:latin typeface="Fira Code" panose="020B0809050000020004" pitchFamily="49" charset="0"/>
+                <a:ea typeface="Fira Code" panose="020B0809050000020004" pitchFamily="49" charset="0"/>
+                <a:cs typeface="Fira Code" panose="020B0809050000020004" pitchFamily="49" charset="0"/>
+              </a:rPr>
+              <a:t>()`</a:t>
             </a:r>
             <a:r>
               <a:rPr lang="en-US" sz="2800" dirty="0">
@@ -19781,6 +21104,11 @@
             </a:r>
             <a:r>
               <a:rPr lang="en-US" sz="2800" dirty="0" err="1">
+                <a:solidFill>
+                  <a:schemeClr val="accent6">
+                    <a:lumMod val="75000"/>
+                  </a:schemeClr>
+                </a:solidFill>
                 <a:latin typeface="Fira Code" panose="020B0809050000020004" pitchFamily="49" charset="0"/>
                 <a:ea typeface="Fira Code" panose="020B0809050000020004" pitchFamily="49" charset="0"/>
                 <a:cs typeface="Fira Code" panose="020B0809050000020004" pitchFamily="49" charset="0"/>
@@ -19789,11 +21117,24 @@
             </a:r>
             <a:r>
               <a:rPr lang="en-US" sz="2800" dirty="0">
-                <a:latin typeface="Fira Code" panose="020B0809050000020004" pitchFamily="49" charset="0"/>
-                <a:ea typeface="Fira Code" panose="020B0809050000020004" pitchFamily="49" charset="0"/>
-                <a:cs typeface="Fira Code" panose="020B0809050000020004" pitchFamily="49" charset="0"/>
-              </a:rPr>
-              <a:t>::glimpse()`</a:t>
+                <a:solidFill>
+                  <a:schemeClr val="accent6">
+                    <a:lumMod val="75000"/>
+                  </a:schemeClr>
+                </a:solidFill>
+                <a:latin typeface="Fira Code" panose="020B0809050000020004" pitchFamily="49" charset="0"/>
+                <a:ea typeface="Fira Code" panose="020B0809050000020004" pitchFamily="49" charset="0"/>
+                <a:cs typeface="Fira Code" panose="020B0809050000020004" pitchFamily="49" charset="0"/>
+              </a:rPr>
+              <a:t>::glimpse</a:t>
+            </a:r>
+            <a:r>
+              <a:rPr lang="en-US" sz="2800" dirty="0">
+                <a:latin typeface="Fira Code" panose="020B0809050000020004" pitchFamily="49" charset="0"/>
+                <a:ea typeface="Fira Code" panose="020B0809050000020004" pitchFamily="49" charset="0"/>
+                <a:cs typeface="Fira Code" panose="020B0809050000020004" pitchFamily="49" charset="0"/>
+              </a:rPr>
+              <a:t>()`</a:t>
             </a:r>
           </a:p>
         </p:txBody>
@@ -23323,7 +24664,12 @@
             <p:ph type="title"/>
           </p:nvPr>
         </p:nvSpPr>
-        <p:spPr/>
+        <p:spPr>
+          <a:xfrm>
+            <a:off x="831850" y="1320800"/>
+            <a:ext cx="10515600" cy="1593497"/>
+          </a:xfrm>
+        </p:spPr>
         <p:txBody>
           <a:bodyPr/>
           <a:lstStyle/>
@@ -23360,7 +24706,7 @@
         </p:nvSpPr>
         <p:spPr>
           <a:xfrm>
-            <a:off x="831850" y="4589463"/>
+            <a:off x="831850" y="2941285"/>
             <a:ext cx="10515600" cy="1500187"/>
           </a:xfrm>
         </p:spPr>
@@ -23487,6 +24833,184 @@
           </a:p>
         </p:txBody>
       </p:sp>
+      <p:grpSp>
+        <p:nvGrpSpPr>
+          <p:cNvPr id="11" name="Group 10">
+            <a:extLst>
+              <a:ext uri="{FF2B5EF4-FFF2-40B4-BE49-F238E27FC236}">
+                <a16:creationId xmlns:a16="http://schemas.microsoft.com/office/drawing/2014/main" id="{8CFACB85-7FED-4D27-813A-53FE6FFBD993}"/>
+              </a:ext>
+            </a:extLst>
+          </p:cNvPr>
+          <p:cNvGrpSpPr/>
+          <p:nvPr/>
+        </p:nvGrpSpPr>
+        <p:grpSpPr>
+          <a:xfrm>
+            <a:off x="9064978" y="5441950"/>
+            <a:ext cx="2813307" cy="914400"/>
+            <a:chOff x="9064978" y="5441950"/>
+            <a:chExt cx="2813307" cy="914400"/>
+          </a:xfrm>
+        </p:grpSpPr>
+        <p:sp>
+          <p:nvSpPr>
+            <p:cNvPr id="10" name="Rectangle 9">
+              <a:extLst>
+                <a:ext uri="{FF2B5EF4-FFF2-40B4-BE49-F238E27FC236}">
+                  <a16:creationId xmlns:a16="http://schemas.microsoft.com/office/drawing/2014/main" id="{0E318EEE-26F6-4338-B68F-E9143FF09D3A}"/>
+                </a:ext>
+              </a:extLst>
+            </p:cNvPr>
+            <p:cNvSpPr/>
+            <p:nvPr/>
+          </p:nvSpPr>
+          <p:spPr>
+            <a:xfrm>
+              <a:off x="9064978" y="5441950"/>
+              <a:ext cx="2813307" cy="914400"/>
+            </a:xfrm>
+            <a:prstGeom prst="rect">
+              <a:avLst/>
+            </a:prstGeom>
+            <a:solidFill>
+              <a:schemeClr val="bg1">
+                <a:lumMod val="95000"/>
+              </a:schemeClr>
+            </a:solidFill>
+            <a:ln>
+              <a:solidFill>
+                <a:schemeClr val="bg1">
+                  <a:lumMod val="65000"/>
+                </a:schemeClr>
+              </a:solidFill>
+            </a:ln>
+          </p:spPr>
+          <p:style>
+            <a:lnRef idx="2">
+              <a:schemeClr val="accent1">
+                <a:shade val="50000"/>
+              </a:schemeClr>
+            </a:lnRef>
+            <a:fillRef idx="1">
+              <a:schemeClr val="accent1"/>
+            </a:fillRef>
+            <a:effectRef idx="0">
+              <a:schemeClr val="accent1"/>
+            </a:effectRef>
+            <a:fontRef idx="minor">
+              <a:schemeClr val="lt1"/>
+            </a:fontRef>
+          </p:style>
+          <p:txBody>
+            <a:bodyPr rtlCol="0" anchor="ctr"/>
+            <a:lstStyle/>
+            <a:p>
+              <a:pPr algn="ctr"/>
+              <a:endParaRPr lang="en-US"/>
+            </a:p>
+          </p:txBody>
+        </p:sp>
+        <p:grpSp>
+          <p:nvGrpSpPr>
+            <p:cNvPr id="9" name="Group 8">
+              <a:extLst>
+                <a:ext uri="{FF2B5EF4-FFF2-40B4-BE49-F238E27FC236}">
+                  <a16:creationId xmlns:a16="http://schemas.microsoft.com/office/drawing/2014/main" id="{D6804241-4F3A-4DB4-A253-5D107536480B}"/>
+                </a:ext>
+              </a:extLst>
+            </p:cNvPr>
+            <p:cNvGrpSpPr/>
+            <p:nvPr/>
+          </p:nvGrpSpPr>
+          <p:grpSpPr>
+            <a:xfrm>
+              <a:off x="9164782" y="5441950"/>
+              <a:ext cx="2713503" cy="914400"/>
+              <a:chOff x="9164782" y="5441950"/>
+              <a:chExt cx="2713503" cy="914400"/>
+            </a:xfrm>
+          </p:grpSpPr>
+          <p:pic>
+            <p:nvPicPr>
+              <p:cNvPr id="3" name="Graphic 2" descr="Stopwatch">
+                <a:extLst>
+                  <a:ext uri="{FF2B5EF4-FFF2-40B4-BE49-F238E27FC236}">
+                    <a16:creationId xmlns:a16="http://schemas.microsoft.com/office/drawing/2014/main" id="{C0DCD660-8FE8-4707-9B9E-25E8C0FF902D}"/>
+                  </a:ext>
+                </a:extLst>
+              </p:cNvPr>
+              <p:cNvPicPr>
+                <a:picLocks noChangeAspect="1"/>
+              </p:cNvPicPr>
+              <p:nvPr/>
+            </p:nvPicPr>
+            <p:blipFill>
+              <a:blip r:embed="rId2">
+                <a:extLst>
+                  <a:ext uri="{28A0092B-C50C-407E-A947-70E740481C1C}">
+                    <a14:useLocalDpi xmlns:a14="http://schemas.microsoft.com/office/drawing/2010/main" val="0"/>
+                  </a:ext>
+                  <a:ext uri="{96DAC541-7B7A-43D3-8B79-37D633B846F1}">
+                    <asvg:svgBlip xmlns:asvg="http://schemas.microsoft.com/office/drawing/2016/SVG/main" r:embed="rId3"/>
+                  </a:ext>
+                </a:extLst>
+              </a:blip>
+              <a:stretch>
+                <a:fillRect/>
+              </a:stretch>
+            </p:blipFill>
+            <p:spPr>
+              <a:xfrm>
+                <a:off x="9164782" y="5441950"/>
+                <a:ext cx="914400" cy="914400"/>
+              </a:xfrm>
+              <a:prstGeom prst="rect">
+                <a:avLst/>
+              </a:prstGeom>
+            </p:spPr>
+          </p:pic>
+          <p:sp>
+            <p:nvSpPr>
+              <p:cNvPr id="8" name="TextBox 7">
+                <a:extLst>
+                  <a:ext uri="{FF2B5EF4-FFF2-40B4-BE49-F238E27FC236}">
+                    <a16:creationId xmlns:a16="http://schemas.microsoft.com/office/drawing/2014/main" id="{819E269D-470F-4C49-B5B8-60CD0CF6EE1B}"/>
+                  </a:ext>
+                </a:extLst>
+              </p:cNvPr>
+              <p:cNvSpPr txBox="1"/>
+              <p:nvPr/>
+            </p:nvSpPr>
+            <p:spPr>
+              <a:xfrm>
+                <a:off x="9958853" y="5586909"/>
+                <a:ext cx="1919432" cy="769441"/>
+              </a:xfrm>
+              <a:prstGeom prst="rect">
+                <a:avLst/>
+              </a:prstGeom>
+              <a:noFill/>
+            </p:spPr>
+            <p:txBody>
+              <a:bodyPr wrap="square" rtlCol="0">
+                <a:spAutoFit/>
+              </a:bodyPr>
+              <a:lstStyle/>
+              <a:p>
+                <a:r>
+                  <a:rPr lang="en-US" sz="4400" dirty="0">
+                    <a:latin typeface="Fira Code" panose="020B0809050000020004" pitchFamily="49" charset="0"/>
+                    <a:ea typeface="Fira Code" panose="020B0809050000020004" pitchFamily="49" charset="0"/>
+                    <a:cs typeface="Fira Code" panose="020B0809050000020004" pitchFamily="49" charset="0"/>
+                  </a:rPr>
+                  <a:t>00:30</a:t>
+                </a:r>
+              </a:p>
+            </p:txBody>
+          </p:sp>
+        </p:grpSp>
+      </p:grpSp>
     </p:spTree>
     <p:extLst>
       <p:ext uri="{BB962C8B-B14F-4D97-AF65-F5344CB8AC3E}">
@@ -25794,7 +27318,7 @@
           <p:cNvPr id="2" name="Title 1">
             <a:extLst>
               <a:ext uri="{FF2B5EF4-FFF2-40B4-BE49-F238E27FC236}">
-                <a16:creationId xmlns:a16="http://schemas.microsoft.com/office/drawing/2014/main" id="{C5801FA0-2E97-462B-B313-2DD18EA6A5DE}"/>
+                <a16:creationId xmlns:a16="http://schemas.microsoft.com/office/drawing/2014/main" id="{228DD621-2A4B-467F-81B4-D5AF6BD57FE3}"/>
               </a:ext>
             </a:extLst>
           </p:cNvPr>
@@ -25812,18 +27336,35 @@
           <a:p>
             <a:pPr algn="ctr"/>
             <a:r>
-              <a:rPr lang="en-US" dirty="0"/>
-              <a:t>Saving your plot</a:t>
-            </a:r>
-          </a:p>
-        </p:txBody>
-      </p:sp>
-      <p:sp>
-        <p:nvSpPr>
-          <p:cNvPr id="6" name="Subtitle 5">
-            <a:extLst>
-              <a:ext uri="{FF2B5EF4-FFF2-40B4-BE49-F238E27FC236}">
-                <a16:creationId xmlns:a16="http://schemas.microsoft.com/office/drawing/2014/main" id="{1889728E-07F6-46BE-AC71-558A57BE938A}"/>
+              <a:rPr lang="en-US" dirty="0">
+                <a:latin typeface="Fira Code" panose="020B0809050000020004" pitchFamily="49" charset="0"/>
+                <a:ea typeface="Fira Code" panose="020B0809050000020004" pitchFamily="49" charset="0"/>
+                <a:cs typeface="Fira Code" panose="020B0809050000020004" pitchFamily="49" charset="0"/>
+              </a:rPr>
+              <a:t> </a:t>
+            </a:r>
+            <a:r>
+              <a:rPr lang="en-US" dirty="0" err="1">
+                <a:latin typeface="Fira Code" panose="020B0809050000020004" pitchFamily="49" charset="0"/>
+                <a:ea typeface="Fira Code" panose="020B0809050000020004" pitchFamily="49" charset="0"/>
+                <a:cs typeface="Fira Code" panose="020B0809050000020004" pitchFamily="49" charset="0"/>
+              </a:rPr>
+              <a:t>ggThemeAssist</a:t>
+            </a:r>
+            <a:endParaRPr lang="en-US" dirty="0">
+              <a:latin typeface="Fira Code" panose="020B0809050000020004" pitchFamily="49" charset="0"/>
+              <a:ea typeface="Fira Code" panose="020B0809050000020004" pitchFamily="49" charset="0"/>
+              <a:cs typeface="Fira Code" panose="020B0809050000020004" pitchFamily="49" charset="0"/>
+            </a:endParaRPr>
+          </a:p>
+        </p:txBody>
+      </p:sp>
+      <p:sp>
+        <p:nvSpPr>
+          <p:cNvPr id="7" name="Subtitle 6">
+            <a:extLst>
+              <a:ext uri="{FF2B5EF4-FFF2-40B4-BE49-F238E27FC236}">
+                <a16:creationId xmlns:a16="http://schemas.microsoft.com/office/drawing/2014/main" id="{3852EB3F-DE1D-4DD1-92C0-FF8CA8FA84B5}"/>
               </a:ext>
             </a:extLst>
           </p:cNvPr>
@@ -25848,7 +27389,7 @@
           <p:cNvPr id="4" name="Footer Placeholder 3">
             <a:extLst>
               <a:ext uri="{FF2B5EF4-FFF2-40B4-BE49-F238E27FC236}">
-                <a16:creationId xmlns:a16="http://schemas.microsoft.com/office/drawing/2014/main" id="{6F28CEC8-D19F-4F3E-A4AC-F5ED5FDD691E}"/>
+                <a16:creationId xmlns:a16="http://schemas.microsoft.com/office/drawing/2014/main" id="{8D8280CD-B6AF-4B06-9D66-CE01264B401F}"/>
               </a:ext>
             </a:extLst>
           </p:cNvPr>
@@ -25876,7 +27417,7 @@
           <p:cNvPr id="5" name="Slide Number Placeholder 4">
             <a:extLst>
               <a:ext uri="{FF2B5EF4-FFF2-40B4-BE49-F238E27FC236}">
-                <a16:creationId xmlns:a16="http://schemas.microsoft.com/office/drawing/2014/main" id="{47210A63-A3AB-4756-85B5-335C879C58D7}"/>
+                <a16:creationId xmlns:a16="http://schemas.microsoft.com/office/drawing/2014/main" id="{015EA4E3-C6CD-467C-94BF-D2006B89E258}"/>
               </a:ext>
             </a:extLst>
           </p:cNvPr>
@@ -25895,6 +27436,147 @@
             <a:fld id="{1D07C8D9-AA71-438D-86BE-7B86F7F29DC7}" type="slidenum">
               <a:rPr lang="en-US" smtClean="0"/>
               <a:t>66</a:t>
+            </a:fld>
+            <a:endParaRPr lang="en-US"/>
+          </a:p>
+        </p:txBody>
+      </p:sp>
+    </p:spTree>
+    <p:extLst>
+      <p:ext uri="{BB962C8B-B14F-4D97-AF65-F5344CB8AC3E}">
+        <p14:creationId xmlns:p14="http://schemas.microsoft.com/office/powerpoint/2010/main" val="2013885492"/>
+      </p:ext>
+    </p:extLst>
+  </p:cSld>
+  <p:clrMapOvr>
+    <a:masterClrMapping/>
+  </p:clrMapOvr>
+</p:sld>
+</file>
+
+<file path=ppt/slides/slide67.xml><?xml version="1.0" encoding="utf-8"?>
+<p:sld xmlns:a="http://schemas.openxmlformats.org/drawingml/2006/main" xmlns:r="http://schemas.openxmlformats.org/officeDocument/2006/relationships" xmlns:p="http://schemas.openxmlformats.org/presentationml/2006/main">
+  <p:cSld>
+    <p:spTree>
+      <p:nvGrpSpPr>
+        <p:cNvPr id="1" name=""/>
+        <p:cNvGrpSpPr/>
+        <p:nvPr/>
+      </p:nvGrpSpPr>
+      <p:grpSpPr>
+        <a:xfrm>
+          <a:off x="0" y="0"/>
+          <a:ext cx="0" cy="0"/>
+          <a:chOff x="0" y="0"/>
+          <a:chExt cx="0" cy="0"/>
+        </a:xfrm>
+      </p:grpSpPr>
+      <p:sp>
+        <p:nvSpPr>
+          <p:cNvPr id="2" name="Title 1">
+            <a:extLst>
+              <a:ext uri="{FF2B5EF4-FFF2-40B4-BE49-F238E27FC236}">
+                <a16:creationId xmlns:a16="http://schemas.microsoft.com/office/drawing/2014/main" id="{C5801FA0-2E97-462B-B313-2DD18EA6A5DE}"/>
+              </a:ext>
+            </a:extLst>
+          </p:cNvPr>
+          <p:cNvSpPr>
+            <a:spLocks noGrp="1"/>
+          </p:cNvSpPr>
+          <p:nvPr>
+            <p:ph type="ctrTitle"/>
+          </p:nvPr>
+        </p:nvSpPr>
+        <p:spPr/>
+        <p:txBody>
+          <a:bodyPr/>
+          <a:lstStyle/>
+          <a:p>
+            <a:pPr algn="ctr"/>
+            <a:r>
+              <a:rPr lang="en-US" dirty="0"/>
+              <a:t>Saving your plot</a:t>
+            </a:r>
+          </a:p>
+        </p:txBody>
+      </p:sp>
+      <p:sp>
+        <p:nvSpPr>
+          <p:cNvPr id="6" name="Subtitle 5">
+            <a:extLst>
+              <a:ext uri="{FF2B5EF4-FFF2-40B4-BE49-F238E27FC236}">
+                <a16:creationId xmlns:a16="http://schemas.microsoft.com/office/drawing/2014/main" id="{1889728E-07F6-46BE-AC71-558A57BE938A}"/>
+              </a:ext>
+            </a:extLst>
+          </p:cNvPr>
+          <p:cNvSpPr>
+            <a:spLocks noGrp="1"/>
+          </p:cNvSpPr>
+          <p:nvPr>
+            <p:ph type="subTitle" idx="1"/>
+          </p:nvPr>
+        </p:nvSpPr>
+        <p:spPr/>
+        <p:txBody>
+          <a:bodyPr/>
+          <a:lstStyle/>
+          <a:p>
+            <a:endParaRPr lang="en-US"/>
+          </a:p>
+        </p:txBody>
+      </p:sp>
+      <p:sp>
+        <p:nvSpPr>
+          <p:cNvPr id="4" name="Footer Placeholder 3">
+            <a:extLst>
+              <a:ext uri="{FF2B5EF4-FFF2-40B4-BE49-F238E27FC236}">
+                <a16:creationId xmlns:a16="http://schemas.microsoft.com/office/drawing/2014/main" id="{6F28CEC8-D19F-4F3E-A4AC-F5ED5FDD691E}"/>
+              </a:ext>
+            </a:extLst>
+          </p:cNvPr>
+          <p:cNvSpPr>
+            <a:spLocks noGrp="1"/>
+          </p:cNvSpPr>
+          <p:nvPr>
+            <p:ph type="ftr" sz="quarter" idx="11"/>
+          </p:nvPr>
+        </p:nvSpPr>
+        <p:spPr/>
+        <p:txBody>
+          <a:bodyPr/>
+          <a:lstStyle/>
+          <a:p>
+            <a:r>
+              <a:rPr lang="en-US"/>
+              <a:t>CERF 2019 | The Next Step with R | Cressman and Dunnigan</a:t>
+            </a:r>
+          </a:p>
+        </p:txBody>
+      </p:sp>
+      <p:sp>
+        <p:nvSpPr>
+          <p:cNvPr id="5" name="Slide Number Placeholder 4">
+            <a:extLst>
+              <a:ext uri="{FF2B5EF4-FFF2-40B4-BE49-F238E27FC236}">
+                <a16:creationId xmlns:a16="http://schemas.microsoft.com/office/drawing/2014/main" id="{47210A63-A3AB-4756-85B5-335C879C58D7}"/>
+              </a:ext>
+            </a:extLst>
+          </p:cNvPr>
+          <p:cNvSpPr>
+            <a:spLocks noGrp="1"/>
+          </p:cNvSpPr>
+          <p:nvPr>
+            <p:ph type="sldNum" sz="quarter" idx="12"/>
+          </p:nvPr>
+        </p:nvSpPr>
+        <p:spPr/>
+        <p:txBody>
+          <a:bodyPr/>
+          <a:lstStyle/>
+          <a:p>
+            <a:fld id="{1D07C8D9-AA71-438D-86BE-7B86F7F29DC7}" type="slidenum">
+              <a:rPr lang="en-US" smtClean="0"/>
+              <a:t>67</a:t>
             </a:fld>
             <a:endParaRPr lang="en-US"/>
           </a:p>
@@ -25913,7 +27595,7 @@
 </p:sld>
 </file>
 
-<file path=ppt/slides/slide67.xml><?xml version="1.0" encoding="utf-8"?>
+<file path=ppt/slides/slide68.xml><?xml version="1.0" encoding="utf-8"?>
 <p:sld xmlns:a="http://schemas.openxmlformats.org/drawingml/2006/main" xmlns:r="http://schemas.openxmlformats.org/officeDocument/2006/relationships" xmlns:p="http://schemas.openxmlformats.org/presentationml/2006/main">
   <p:cSld>
     <p:bg>
@@ -26109,235 +27791,194 @@
           <a:p>
             <a:fld id="{1D07C8D9-AA71-438D-86BE-7B86F7F29DC7}" type="slidenum">
               <a:rPr lang="en-US" smtClean="0"/>
-              <a:t>67</a:t>
+              <a:t>68</a:t>
             </a:fld>
             <a:endParaRPr lang="en-US"/>
           </a:p>
         </p:txBody>
       </p:sp>
+      <p:grpSp>
+        <p:nvGrpSpPr>
+          <p:cNvPr id="6" name="Group 5">
+            <a:extLst>
+              <a:ext uri="{FF2B5EF4-FFF2-40B4-BE49-F238E27FC236}">
+                <a16:creationId xmlns:a16="http://schemas.microsoft.com/office/drawing/2014/main" id="{EED3927F-CF3A-4A1D-8B3A-9484D028E298}"/>
+              </a:ext>
+            </a:extLst>
+          </p:cNvPr>
+          <p:cNvGrpSpPr/>
+          <p:nvPr/>
+        </p:nvGrpSpPr>
+        <p:grpSpPr>
+          <a:xfrm>
+            <a:off x="9064978" y="5441950"/>
+            <a:ext cx="2813307" cy="914400"/>
+            <a:chOff x="9064978" y="5441950"/>
+            <a:chExt cx="2813307" cy="914400"/>
+          </a:xfrm>
+        </p:grpSpPr>
+        <p:sp>
+          <p:nvSpPr>
+            <p:cNvPr id="7" name="Rectangle 6">
+              <a:extLst>
+                <a:ext uri="{FF2B5EF4-FFF2-40B4-BE49-F238E27FC236}">
+                  <a16:creationId xmlns:a16="http://schemas.microsoft.com/office/drawing/2014/main" id="{DBC8D010-022C-409D-8BC6-E398BE7A3BC9}"/>
+                </a:ext>
+              </a:extLst>
+            </p:cNvPr>
+            <p:cNvSpPr/>
+            <p:nvPr/>
+          </p:nvSpPr>
+          <p:spPr>
+            <a:xfrm>
+              <a:off x="9064978" y="5441950"/>
+              <a:ext cx="2813307" cy="914400"/>
+            </a:xfrm>
+            <a:prstGeom prst="rect">
+              <a:avLst/>
+            </a:prstGeom>
+            <a:solidFill>
+              <a:schemeClr val="bg1">
+                <a:lumMod val="95000"/>
+              </a:schemeClr>
+            </a:solidFill>
+            <a:ln>
+              <a:solidFill>
+                <a:schemeClr val="bg1">
+                  <a:lumMod val="65000"/>
+                </a:schemeClr>
+              </a:solidFill>
+            </a:ln>
+          </p:spPr>
+          <p:style>
+            <a:lnRef idx="2">
+              <a:schemeClr val="accent1">
+                <a:shade val="50000"/>
+              </a:schemeClr>
+            </a:lnRef>
+            <a:fillRef idx="1">
+              <a:schemeClr val="accent1"/>
+            </a:fillRef>
+            <a:effectRef idx="0">
+              <a:schemeClr val="accent1"/>
+            </a:effectRef>
+            <a:fontRef idx="minor">
+              <a:schemeClr val="lt1"/>
+            </a:fontRef>
+          </p:style>
+          <p:txBody>
+            <a:bodyPr rtlCol="0" anchor="ctr"/>
+            <a:lstStyle/>
+            <a:p>
+              <a:pPr algn="ctr"/>
+              <a:endParaRPr lang="en-US"/>
+            </a:p>
+          </p:txBody>
+        </p:sp>
+        <p:grpSp>
+          <p:nvGrpSpPr>
+            <p:cNvPr id="8" name="Group 7">
+              <a:extLst>
+                <a:ext uri="{FF2B5EF4-FFF2-40B4-BE49-F238E27FC236}">
+                  <a16:creationId xmlns:a16="http://schemas.microsoft.com/office/drawing/2014/main" id="{025F9E3F-20C7-4EBC-BDA7-76D717A96C5D}"/>
+                </a:ext>
+              </a:extLst>
+            </p:cNvPr>
+            <p:cNvGrpSpPr/>
+            <p:nvPr/>
+          </p:nvGrpSpPr>
+          <p:grpSpPr>
+            <a:xfrm>
+              <a:off x="9164782" y="5441950"/>
+              <a:ext cx="2713503" cy="914400"/>
+              <a:chOff x="9164782" y="5441950"/>
+              <a:chExt cx="2713503" cy="914400"/>
+            </a:xfrm>
+          </p:grpSpPr>
+          <p:pic>
+            <p:nvPicPr>
+              <p:cNvPr id="9" name="Graphic 8" descr="Stopwatch">
+                <a:extLst>
+                  <a:ext uri="{FF2B5EF4-FFF2-40B4-BE49-F238E27FC236}">
+                    <a16:creationId xmlns:a16="http://schemas.microsoft.com/office/drawing/2014/main" id="{8C50A5B1-B296-4A6C-99FC-91C840D3C08F}"/>
+                  </a:ext>
+                </a:extLst>
+              </p:cNvPr>
+              <p:cNvPicPr>
+                <a:picLocks noChangeAspect="1"/>
+              </p:cNvPicPr>
+              <p:nvPr/>
+            </p:nvPicPr>
+            <p:blipFill>
+              <a:blip r:embed="rId2">
+                <a:extLst>
+                  <a:ext uri="{28A0092B-C50C-407E-A947-70E740481C1C}">
+                    <a14:useLocalDpi xmlns:a14="http://schemas.microsoft.com/office/drawing/2010/main" val="0"/>
+                  </a:ext>
+                  <a:ext uri="{96DAC541-7B7A-43D3-8B79-37D633B846F1}">
+                    <asvg:svgBlip xmlns:asvg="http://schemas.microsoft.com/office/drawing/2016/SVG/main" r:embed="rId3"/>
+                  </a:ext>
+                </a:extLst>
+              </a:blip>
+              <a:stretch>
+                <a:fillRect/>
+              </a:stretch>
+            </p:blipFill>
+            <p:spPr>
+              <a:xfrm>
+                <a:off x="9164782" y="5441950"/>
+                <a:ext cx="914400" cy="914400"/>
+              </a:xfrm>
+              <a:prstGeom prst="rect">
+                <a:avLst/>
+              </a:prstGeom>
+            </p:spPr>
+          </p:pic>
+          <p:sp>
+            <p:nvSpPr>
+              <p:cNvPr id="10" name="TextBox 9">
+                <a:extLst>
+                  <a:ext uri="{FF2B5EF4-FFF2-40B4-BE49-F238E27FC236}">
+                    <a16:creationId xmlns:a16="http://schemas.microsoft.com/office/drawing/2014/main" id="{EFBDBF23-3C05-4777-AC02-C940879CA406}"/>
+                  </a:ext>
+                </a:extLst>
+              </p:cNvPr>
+              <p:cNvSpPr txBox="1"/>
+              <p:nvPr/>
+            </p:nvSpPr>
+            <p:spPr>
+              <a:xfrm>
+                <a:off x="9958853" y="5586909"/>
+                <a:ext cx="1919432" cy="769441"/>
+              </a:xfrm>
+              <a:prstGeom prst="rect">
+                <a:avLst/>
+              </a:prstGeom>
+              <a:noFill/>
+            </p:spPr>
+            <p:txBody>
+              <a:bodyPr wrap="square" rtlCol="0">
+                <a:spAutoFit/>
+              </a:bodyPr>
+              <a:lstStyle/>
+              <a:p>
+                <a:r>
+                  <a:rPr lang="en-US" sz="4400" dirty="0">
+                    <a:latin typeface="Fira Code" panose="020B0809050000020004" pitchFamily="49" charset="0"/>
+                    <a:ea typeface="Fira Code" panose="020B0809050000020004" pitchFamily="49" charset="0"/>
+                    <a:cs typeface="Fira Code" panose="020B0809050000020004" pitchFamily="49" charset="0"/>
+                  </a:rPr>
+                  <a:t>00:30</a:t>
+                </a:r>
+              </a:p>
+            </p:txBody>
+          </p:sp>
+        </p:grpSp>
+      </p:grpSp>
     </p:spTree>
     <p:extLst>
       <p:ext uri="{BB962C8B-B14F-4D97-AF65-F5344CB8AC3E}">
         <p14:creationId xmlns:p14="http://schemas.microsoft.com/office/powerpoint/2010/main" val="3232525341"/>
-      </p:ext>
-    </p:extLst>
-  </p:cSld>
-  <p:clrMapOvr>
-    <a:masterClrMapping/>
-  </p:clrMapOvr>
-</p:sld>
-</file>
-
-<file path=ppt/slides/slide68.xml><?xml version="1.0" encoding="utf-8"?>
-<p:sld xmlns:a="http://schemas.openxmlformats.org/drawingml/2006/main" xmlns:r="http://schemas.openxmlformats.org/officeDocument/2006/relationships" xmlns:p="http://schemas.openxmlformats.org/presentationml/2006/main">
-  <p:cSld>
-    <p:spTree>
-      <p:nvGrpSpPr>
-        <p:cNvPr id="1" name=""/>
-        <p:cNvGrpSpPr/>
-        <p:nvPr/>
-      </p:nvGrpSpPr>
-      <p:grpSpPr>
-        <a:xfrm>
-          <a:off x="0" y="0"/>
-          <a:ext cx="0" cy="0"/>
-          <a:chOff x="0" y="0"/>
-          <a:chExt cx="0" cy="0"/>
-        </a:xfrm>
-      </p:grpSpPr>
-      <p:sp>
-        <p:nvSpPr>
-          <p:cNvPr id="6" name="Title 5">
-            <a:extLst>
-              <a:ext uri="{FF2B5EF4-FFF2-40B4-BE49-F238E27FC236}">
-                <a16:creationId xmlns:a16="http://schemas.microsoft.com/office/drawing/2014/main" id="{0FE81C29-6857-4427-BF51-2832E7B6AF22}"/>
-              </a:ext>
-            </a:extLst>
-          </p:cNvPr>
-          <p:cNvSpPr>
-            <a:spLocks noGrp="1"/>
-          </p:cNvSpPr>
-          <p:nvPr>
-            <p:ph type="title"/>
-          </p:nvPr>
-        </p:nvSpPr>
-        <p:spPr/>
-        <p:txBody>
-          <a:bodyPr/>
-          <a:lstStyle/>
-          <a:p>
-            <a:pPr algn="ctr"/>
-            <a:r>
-              <a:rPr lang="en-US" dirty="0"/>
-              <a:t>The Working Directory</a:t>
-            </a:r>
-          </a:p>
-        </p:txBody>
-      </p:sp>
-      <p:sp>
-        <p:nvSpPr>
-          <p:cNvPr id="7" name="Content Placeholder 6">
-            <a:extLst>
-              <a:ext uri="{FF2B5EF4-FFF2-40B4-BE49-F238E27FC236}">
-                <a16:creationId xmlns:a16="http://schemas.microsoft.com/office/drawing/2014/main" id="{3AE09030-8DDE-4B86-B007-27EE5632B4BE}"/>
-              </a:ext>
-            </a:extLst>
-          </p:cNvPr>
-          <p:cNvSpPr>
-            <a:spLocks noGrp="1"/>
-          </p:cNvSpPr>
-          <p:nvPr>
-            <p:ph idx="1"/>
-          </p:nvPr>
-        </p:nvSpPr>
-        <p:spPr/>
-        <p:txBody>
-          <a:bodyPr>
-            <a:normAutofit/>
-          </a:bodyPr>
-          <a:lstStyle/>
-          <a:p>
-            <a:pPr marL="0" indent="0">
-              <a:buNone/>
-            </a:pPr>
-            <a:r>
-              <a:rPr lang="en-US" sz="3600" dirty="0"/>
-              <a:t>R associates itself with a folder (i.e., directory) on your computer.</a:t>
-            </a:r>
-          </a:p>
-          <a:p>
-            <a:pPr lvl="2"/>
-            <a:r>
-              <a:rPr lang="en-US" sz="3600" dirty="0"/>
-              <a:t>This is the “working directory”</a:t>
-            </a:r>
-          </a:p>
-          <a:p>
-            <a:pPr lvl="2"/>
-            <a:r>
-              <a:rPr lang="en-US" sz="3600" dirty="0"/>
-              <a:t>R will look for files here</a:t>
-            </a:r>
-          </a:p>
-          <a:p>
-            <a:pPr lvl="2"/>
-            <a:r>
-              <a:rPr lang="en-US" sz="3600" dirty="0"/>
-              <a:t>R will save files here</a:t>
-            </a:r>
-          </a:p>
-        </p:txBody>
-      </p:sp>
-      <p:sp>
-        <p:nvSpPr>
-          <p:cNvPr id="4" name="Footer Placeholder 3">
-            <a:extLst>
-              <a:ext uri="{FF2B5EF4-FFF2-40B4-BE49-F238E27FC236}">
-                <a16:creationId xmlns:a16="http://schemas.microsoft.com/office/drawing/2014/main" id="{50023B57-EA94-47EE-9C2C-ECEB9DBFFFAC}"/>
-              </a:ext>
-            </a:extLst>
-          </p:cNvPr>
-          <p:cNvSpPr>
-            <a:spLocks noGrp="1"/>
-          </p:cNvSpPr>
-          <p:nvPr>
-            <p:ph type="ftr" sz="quarter" idx="11"/>
-          </p:nvPr>
-        </p:nvSpPr>
-        <p:spPr/>
-        <p:txBody>
-          <a:bodyPr/>
-          <a:lstStyle/>
-          <a:p>
-            <a:r>
-              <a:rPr lang="en-US"/>
-              <a:t>CERF 2019 | The Next Step with R | Cressman and Dunnigan</a:t>
-            </a:r>
-          </a:p>
-        </p:txBody>
-      </p:sp>
-      <p:sp>
-        <p:nvSpPr>
-          <p:cNvPr id="5" name="Slide Number Placeholder 4">
-            <a:extLst>
-              <a:ext uri="{FF2B5EF4-FFF2-40B4-BE49-F238E27FC236}">
-                <a16:creationId xmlns:a16="http://schemas.microsoft.com/office/drawing/2014/main" id="{A2582723-E198-4834-89EB-3DED6F5CB4A2}"/>
-              </a:ext>
-            </a:extLst>
-          </p:cNvPr>
-          <p:cNvSpPr>
-            <a:spLocks noGrp="1"/>
-          </p:cNvSpPr>
-          <p:nvPr>
-            <p:ph type="sldNum" sz="quarter" idx="12"/>
-          </p:nvPr>
-        </p:nvSpPr>
-        <p:spPr/>
-        <p:txBody>
-          <a:bodyPr/>
-          <a:lstStyle/>
-          <a:p>
-            <a:fld id="{1D07C8D9-AA71-438D-86BE-7B86F7F29DC7}" type="slidenum">
-              <a:rPr lang="en-US" smtClean="0"/>
-              <a:t>68</a:t>
-            </a:fld>
-            <a:endParaRPr lang="en-US"/>
-          </a:p>
-        </p:txBody>
-      </p:sp>
-      <p:sp>
-        <p:nvSpPr>
-          <p:cNvPr id="8" name="Rectangle: Rounded Corners 7">
-            <a:extLst>
-              <a:ext uri="{FF2B5EF4-FFF2-40B4-BE49-F238E27FC236}">
-                <a16:creationId xmlns:a16="http://schemas.microsoft.com/office/drawing/2014/main" id="{F1156D37-73E1-4C2F-931B-2D368105B1C7}"/>
-              </a:ext>
-            </a:extLst>
-          </p:cNvPr>
-          <p:cNvSpPr/>
-          <p:nvPr/>
-        </p:nvSpPr>
-        <p:spPr>
-          <a:xfrm>
-            <a:off x="7548880" y="4003040"/>
-            <a:ext cx="3566160" cy="1838960"/>
-          </a:xfrm>
-          <a:prstGeom prst="roundRect">
-            <a:avLst/>
-          </a:prstGeom>
-        </p:spPr>
-        <p:style>
-          <a:lnRef idx="2">
-            <a:schemeClr val="accent1">
-              <a:shade val="50000"/>
-            </a:schemeClr>
-          </a:lnRef>
-          <a:fillRef idx="1">
-            <a:schemeClr val="accent1"/>
-          </a:fillRef>
-          <a:effectRef idx="0">
-            <a:schemeClr val="accent1"/>
-          </a:effectRef>
-          <a:fontRef idx="minor">
-            <a:schemeClr val="lt1"/>
-          </a:fontRef>
-        </p:style>
-        <p:txBody>
-          <a:bodyPr rtlCol="0" anchor="ctr"/>
-          <a:lstStyle/>
-          <a:p>
-            <a:pPr algn="ctr"/>
-            <a:r>
-              <a:rPr lang="en-US" sz="2400" dirty="0"/>
-              <a:t>The files pane of RStudio IDE will display your working directory</a:t>
-            </a:r>
-          </a:p>
-        </p:txBody>
-      </p:sp>
-    </p:spTree>
-    <p:extLst>
-      <p:ext uri="{BB962C8B-B14F-4D97-AF65-F5344CB8AC3E}">
-        <p14:creationId xmlns:p14="http://schemas.microsoft.com/office/powerpoint/2010/main" val="163624777"/>
       </p:ext>
     </p:extLst>
   </p:cSld>
@@ -26366,10 +28007,10 @@
       </p:grpSpPr>
       <p:sp>
         <p:nvSpPr>
-          <p:cNvPr id="2" name="Title 1">
-            <a:extLst>
-              <a:ext uri="{FF2B5EF4-FFF2-40B4-BE49-F238E27FC236}">
-                <a16:creationId xmlns:a16="http://schemas.microsoft.com/office/drawing/2014/main" id="{151FF821-05CE-41E9-98CE-75AAA7D9FB79}"/>
+          <p:cNvPr id="6" name="Title 5">
+            <a:extLst>
+              <a:ext uri="{FF2B5EF4-FFF2-40B4-BE49-F238E27FC236}">
+                <a16:creationId xmlns:a16="http://schemas.microsoft.com/office/drawing/2014/main" id="{0FE81C29-6857-4427-BF51-2832E7B6AF22}"/>
               </a:ext>
             </a:extLst>
           </p:cNvPr>
@@ -26388,17 +28029,17 @@
             <a:pPr algn="ctr"/>
             <a:r>
               <a:rPr lang="en-US" dirty="0"/>
-              <a:t>Saving plots</a:t>
-            </a:r>
-          </a:p>
-        </p:txBody>
-      </p:sp>
-      <p:sp>
-        <p:nvSpPr>
-          <p:cNvPr id="3" name="Content Placeholder 2">
-            <a:extLst>
-              <a:ext uri="{FF2B5EF4-FFF2-40B4-BE49-F238E27FC236}">
-                <a16:creationId xmlns:a16="http://schemas.microsoft.com/office/drawing/2014/main" id="{934BB3BB-0680-4BDE-9CC2-01CA273BA8EC}"/>
+              <a:t>The Working Directory</a:t>
+            </a:r>
+          </a:p>
+        </p:txBody>
+      </p:sp>
+      <p:sp>
+        <p:nvSpPr>
+          <p:cNvPr id="7" name="Content Placeholder 6">
+            <a:extLst>
+              <a:ext uri="{FF2B5EF4-FFF2-40B4-BE49-F238E27FC236}">
+                <a16:creationId xmlns:a16="http://schemas.microsoft.com/office/drawing/2014/main" id="{3AE09030-8DDE-4B86-B007-27EE5632B4BE}"/>
               </a:ext>
             </a:extLst>
           </p:cNvPr>
@@ -26409,15 +28050,10 @@
             <p:ph idx="1"/>
           </p:nvPr>
         </p:nvSpPr>
-        <p:spPr>
-          <a:xfrm>
-            <a:off x="838200" y="1825625"/>
-            <a:ext cx="10835640" cy="4351338"/>
-          </a:xfrm>
-        </p:spPr>
+        <p:spPr/>
         <p:txBody>
           <a:bodyPr>
-            <a:normAutofit fontScale="92500" lnSpcReduction="20000"/>
+            <a:normAutofit/>
           </a:bodyPr>
           <a:lstStyle/>
           <a:p>
@@ -26425,293 +28061,30 @@
               <a:buNone/>
             </a:pPr>
             <a:r>
-              <a:rPr lang="en-US" dirty="0"/>
-              <a:t> </a:t>
-            </a:r>
-            <a:r>
-              <a:rPr lang="en-US" dirty="0" err="1">
-                <a:solidFill>
-                  <a:schemeClr val="accent6">
-                    <a:lumMod val="75000"/>
-                  </a:schemeClr>
-                </a:solidFill>
-                <a:latin typeface="Fira Code" panose="020B0809050000020004" pitchFamily="49" charset="0"/>
-                <a:ea typeface="Fira Code" panose="020B0809050000020004" pitchFamily="49" charset="0"/>
-                <a:cs typeface="Fira Code" panose="020B0809050000020004" pitchFamily="49" charset="0"/>
-              </a:rPr>
-              <a:t>ggsave</a:t>
-            </a:r>
-            <a:r>
-              <a:rPr lang="en-US" dirty="0">
-                <a:solidFill>
-                  <a:schemeClr val="accent6">
-                    <a:lumMod val="75000"/>
-                  </a:schemeClr>
-                </a:solidFill>
-                <a:latin typeface="Fira Code" panose="020B0809050000020004" pitchFamily="49" charset="0"/>
-                <a:ea typeface="Fira Code" panose="020B0809050000020004" pitchFamily="49" charset="0"/>
-                <a:cs typeface="Fira Code" panose="020B0809050000020004" pitchFamily="49" charset="0"/>
-              </a:rPr>
-              <a:t>() </a:t>
-            </a:r>
-            <a:r>
-              <a:rPr lang="en-US" sz="3500" dirty="0"/>
-              <a:t>will save the last plot.</a:t>
-            </a:r>
-          </a:p>
-          <a:p>
-            <a:pPr marL="0" indent="0">
-              <a:buNone/>
-            </a:pPr>
-            <a:r>
-              <a:rPr lang="en-US" sz="2400" dirty="0">
-                <a:latin typeface="Fira Code" panose="020B0809050000020004" pitchFamily="49" charset="0"/>
-                <a:ea typeface="Fira Code" panose="020B0809050000020004" pitchFamily="49" charset="0"/>
-                <a:cs typeface="Fira Code" panose="020B0809050000020004" pitchFamily="49" charset="0"/>
-              </a:rPr>
-              <a:t>   </a:t>
-            </a:r>
-            <a:r>
-              <a:rPr lang="en-US" sz="2400" dirty="0" err="1">
-                <a:latin typeface="Fira Code" panose="020B0809050000020004" pitchFamily="49" charset="0"/>
-                <a:ea typeface="Fira Code" panose="020B0809050000020004" pitchFamily="49" charset="0"/>
-                <a:cs typeface="Fira Code" panose="020B0809050000020004" pitchFamily="49" charset="0"/>
-              </a:rPr>
-              <a:t>ggsave</a:t>
-            </a:r>
-            <a:r>
-              <a:rPr lang="en-US" sz="2400" dirty="0">
-                <a:latin typeface="Fira Code" panose="020B0809050000020004" pitchFamily="49" charset="0"/>
-                <a:ea typeface="Fira Code" panose="020B0809050000020004" pitchFamily="49" charset="0"/>
-                <a:cs typeface="Fira Code" panose="020B0809050000020004" pitchFamily="49" charset="0"/>
-              </a:rPr>
-              <a:t>(“my-first-plot</a:t>
-            </a:r>
-            <a:r>
-              <a:rPr lang="en-US" sz="2400" dirty="0">
-                <a:solidFill>
-                  <a:schemeClr val="accent6">
-                    <a:lumMod val="75000"/>
-                  </a:schemeClr>
-                </a:solidFill>
-                <a:latin typeface="Fira Code" panose="020B0809050000020004" pitchFamily="49" charset="0"/>
-                <a:ea typeface="Fira Code" panose="020B0809050000020004" pitchFamily="49" charset="0"/>
-                <a:cs typeface="Fira Code" panose="020B0809050000020004" pitchFamily="49" charset="0"/>
-              </a:rPr>
-              <a:t>.png</a:t>
-            </a:r>
-            <a:r>
-              <a:rPr lang="en-US" sz="2400" dirty="0">
-                <a:latin typeface="Fira Code" panose="020B0809050000020004" pitchFamily="49" charset="0"/>
-                <a:ea typeface="Fira Code" panose="020B0809050000020004" pitchFamily="49" charset="0"/>
-                <a:cs typeface="Fira Code" panose="020B0809050000020004" pitchFamily="49" charset="0"/>
-              </a:rPr>
-              <a:t>”)</a:t>
-            </a:r>
-          </a:p>
-          <a:p>
-            <a:pPr marL="0" indent="0">
-              <a:buNone/>
-            </a:pPr>
-            <a:r>
-              <a:rPr lang="en-US" sz="2400" dirty="0">
-                <a:latin typeface="Fira Code" panose="020B0809050000020004" pitchFamily="49" charset="0"/>
-                <a:ea typeface="Fira Code" panose="020B0809050000020004" pitchFamily="49" charset="0"/>
-                <a:cs typeface="Fira Code" panose="020B0809050000020004" pitchFamily="49" charset="0"/>
-              </a:rPr>
-              <a:t>   </a:t>
-            </a:r>
-            <a:r>
-              <a:rPr lang="en-US" sz="2400" dirty="0" err="1">
-                <a:latin typeface="Fira Code" panose="020B0809050000020004" pitchFamily="49" charset="0"/>
-                <a:ea typeface="Fira Code" panose="020B0809050000020004" pitchFamily="49" charset="0"/>
-                <a:cs typeface="Fira Code" panose="020B0809050000020004" pitchFamily="49" charset="0"/>
-              </a:rPr>
-              <a:t>ggsave</a:t>
-            </a:r>
-            <a:r>
-              <a:rPr lang="en-US" sz="2400" dirty="0">
-                <a:latin typeface="Fira Code" panose="020B0809050000020004" pitchFamily="49" charset="0"/>
-                <a:ea typeface="Fira Code" panose="020B0809050000020004" pitchFamily="49" charset="0"/>
-                <a:cs typeface="Fira Code" panose="020B0809050000020004" pitchFamily="49" charset="0"/>
-              </a:rPr>
-              <a:t>(“my-first-plot</a:t>
-            </a:r>
-            <a:r>
-              <a:rPr lang="en-US" sz="2400" dirty="0">
-                <a:solidFill>
-                  <a:schemeClr val="accent6">
-                    <a:lumMod val="75000"/>
-                  </a:schemeClr>
-                </a:solidFill>
-                <a:latin typeface="Fira Code" panose="020B0809050000020004" pitchFamily="49" charset="0"/>
-                <a:ea typeface="Fira Code" panose="020B0809050000020004" pitchFamily="49" charset="0"/>
-                <a:cs typeface="Fira Code" panose="020B0809050000020004" pitchFamily="49" charset="0"/>
-              </a:rPr>
-              <a:t>.tiff</a:t>
-            </a:r>
-            <a:r>
-              <a:rPr lang="en-US" sz="2400" dirty="0">
-                <a:latin typeface="Fira Code" panose="020B0809050000020004" pitchFamily="49" charset="0"/>
-                <a:ea typeface="Fira Code" panose="020B0809050000020004" pitchFamily="49" charset="0"/>
-                <a:cs typeface="Fira Code" panose="020B0809050000020004" pitchFamily="49" charset="0"/>
-              </a:rPr>
-              <a:t>”)</a:t>
-            </a:r>
-          </a:p>
-          <a:p>
-            <a:pPr marL="0" indent="0">
-              <a:buNone/>
-            </a:pPr>
-            <a:endParaRPr lang="en-US" sz="3500" dirty="0"/>
-          </a:p>
-          <a:p>
-            <a:pPr marL="0" indent="0">
-              <a:buNone/>
-            </a:pPr>
-            <a:r>
-              <a:rPr lang="en-US" sz="3500" dirty="0"/>
-              <a:t>You can further specify size:</a:t>
-            </a:r>
-          </a:p>
-          <a:p>
-            <a:pPr marL="0" indent="0">
-              <a:buNone/>
-            </a:pPr>
-            <a:r>
-              <a:rPr lang="en-US" sz="2400" dirty="0">
-                <a:latin typeface="Fira Code" panose="020B0809050000020004" pitchFamily="49" charset="0"/>
-                <a:ea typeface="Fira Code" panose="020B0809050000020004" pitchFamily="49" charset="0"/>
-                <a:cs typeface="Fira Code" panose="020B0809050000020004" pitchFamily="49" charset="0"/>
-              </a:rPr>
-              <a:t>   </a:t>
-            </a:r>
-            <a:r>
-              <a:rPr lang="en-US" sz="2400" dirty="0" err="1">
-                <a:latin typeface="Fira Code" panose="020B0809050000020004" pitchFamily="49" charset="0"/>
-                <a:ea typeface="Fira Code" panose="020B0809050000020004" pitchFamily="49" charset="0"/>
-                <a:cs typeface="Fira Code" panose="020B0809050000020004" pitchFamily="49" charset="0"/>
-              </a:rPr>
-              <a:t>ggsave</a:t>
-            </a:r>
-            <a:r>
-              <a:rPr lang="en-US" sz="2400" dirty="0">
-                <a:latin typeface="Fira Code" panose="020B0809050000020004" pitchFamily="49" charset="0"/>
-                <a:ea typeface="Fira Code" panose="020B0809050000020004" pitchFamily="49" charset="0"/>
-                <a:cs typeface="Fira Code" panose="020B0809050000020004" pitchFamily="49" charset="0"/>
-              </a:rPr>
-              <a:t>(“my-first-plot.png”, </a:t>
-            </a:r>
-            <a:r>
-              <a:rPr lang="en-US" sz="2400" dirty="0">
-                <a:solidFill>
-                  <a:schemeClr val="accent6">
-                    <a:lumMod val="75000"/>
-                  </a:schemeClr>
-                </a:solidFill>
-                <a:latin typeface="Fira Code" panose="020B0809050000020004" pitchFamily="49" charset="0"/>
-                <a:ea typeface="Fira Code" panose="020B0809050000020004" pitchFamily="49" charset="0"/>
-                <a:cs typeface="Fira Code" panose="020B0809050000020004" pitchFamily="49" charset="0"/>
-              </a:rPr>
-              <a:t>height = 6, width = 8,</a:t>
-            </a:r>
-          </a:p>
-          <a:p>
-            <a:pPr marL="0" indent="0">
-              <a:buNone/>
-            </a:pPr>
-            <a:r>
-              <a:rPr lang="en-US" sz="2400" dirty="0">
-                <a:solidFill>
-                  <a:schemeClr val="accent6">
-                    <a:lumMod val="75000"/>
-                  </a:schemeClr>
-                </a:solidFill>
-                <a:latin typeface="Fira Code" panose="020B0809050000020004" pitchFamily="49" charset="0"/>
-                <a:ea typeface="Fira Code" panose="020B0809050000020004" pitchFamily="49" charset="0"/>
-                <a:cs typeface="Fira Code" panose="020B0809050000020004" pitchFamily="49" charset="0"/>
-              </a:rPr>
-              <a:t>           units = “cm”</a:t>
-            </a:r>
-            <a:r>
-              <a:rPr lang="en-US" sz="2400" dirty="0">
-                <a:latin typeface="Fira Code" panose="020B0809050000020004" pitchFamily="49" charset="0"/>
-                <a:ea typeface="Fira Code" panose="020B0809050000020004" pitchFamily="49" charset="0"/>
-                <a:cs typeface="Fira Code" panose="020B0809050000020004" pitchFamily="49" charset="0"/>
-              </a:rPr>
-              <a:t>)</a:t>
-            </a:r>
-            <a:endParaRPr lang="en-US" dirty="0">
-              <a:latin typeface="Fira Code" panose="020B0809050000020004" pitchFamily="49" charset="0"/>
-              <a:ea typeface="Fira Code" panose="020B0809050000020004" pitchFamily="49" charset="0"/>
-              <a:cs typeface="Fira Code" panose="020B0809050000020004" pitchFamily="49" charset="0"/>
-            </a:endParaRPr>
-          </a:p>
-          <a:p>
-            <a:pPr marL="0" indent="0">
-              <a:buNone/>
-            </a:pPr>
-            <a:endParaRPr lang="en-US" dirty="0"/>
-          </a:p>
-          <a:p>
-            <a:pPr marL="0" indent="0">
-              <a:buNone/>
-            </a:pPr>
-            <a:r>
-              <a:rPr lang="en-US" sz="3500" dirty="0"/>
-              <a:t>Or even resolution:</a:t>
-            </a:r>
-          </a:p>
-          <a:p>
-            <a:pPr marL="0" indent="0">
-              <a:buNone/>
-            </a:pPr>
-            <a:r>
-              <a:rPr lang="en-US" dirty="0"/>
-              <a:t>	</a:t>
-            </a:r>
-            <a:r>
-              <a:rPr lang="en-US" sz="2400" dirty="0" err="1">
-                <a:latin typeface="Fira Code" panose="020B0809050000020004" pitchFamily="49" charset="0"/>
-                <a:ea typeface="Fira Code" panose="020B0809050000020004" pitchFamily="49" charset="0"/>
-                <a:cs typeface="Fira Code" panose="020B0809050000020004" pitchFamily="49" charset="0"/>
-              </a:rPr>
-              <a:t>ggsave</a:t>
-            </a:r>
-            <a:r>
-              <a:rPr lang="en-US" sz="2400" dirty="0">
-                <a:latin typeface="Fira Code" panose="020B0809050000020004" pitchFamily="49" charset="0"/>
-                <a:ea typeface="Fira Code" panose="020B0809050000020004" pitchFamily="49" charset="0"/>
-                <a:cs typeface="Fira Code" panose="020B0809050000020004" pitchFamily="49" charset="0"/>
-              </a:rPr>
-              <a:t>(“my-first-plot.png”, </a:t>
-            </a:r>
-            <a:r>
-              <a:rPr lang="en-US" sz="2400" dirty="0">
-                <a:solidFill>
-                  <a:schemeClr val="accent6">
-                    <a:lumMod val="75000"/>
-                  </a:schemeClr>
-                </a:solidFill>
-                <a:latin typeface="Fira Code" panose="020B0809050000020004" pitchFamily="49" charset="0"/>
-                <a:ea typeface="Fira Code" panose="020B0809050000020004" pitchFamily="49" charset="0"/>
-                <a:cs typeface="Fira Code" panose="020B0809050000020004" pitchFamily="49" charset="0"/>
-              </a:rPr>
-              <a:t>dpi = 300</a:t>
-            </a:r>
-            <a:r>
-              <a:rPr lang="en-US" sz="2400" dirty="0">
-                <a:latin typeface="Fira Code" panose="020B0809050000020004" pitchFamily="49" charset="0"/>
-                <a:ea typeface="Fira Code" panose="020B0809050000020004" pitchFamily="49" charset="0"/>
-                <a:cs typeface="Fira Code" panose="020B0809050000020004" pitchFamily="49" charset="0"/>
-              </a:rPr>
-              <a:t>)</a:t>
-            </a:r>
-            <a:endParaRPr lang="en-US" dirty="0">
-              <a:latin typeface="Fira Code" panose="020B0809050000020004" pitchFamily="49" charset="0"/>
-              <a:ea typeface="Fira Code" panose="020B0809050000020004" pitchFamily="49" charset="0"/>
-              <a:cs typeface="Fira Code" panose="020B0809050000020004" pitchFamily="49" charset="0"/>
-            </a:endParaRPr>
+              <a:rPr lang="en-US" sz="3600" dirty="0"/>
+              <a:t>R associates itself with a folder (i.e., directory) on your computer.</a:t>
+            </a:r>
+          </a:p>
+          <a:p>
+            <a:pPr lvl="2"/>
+            <a:r>
+              <a:rPr lang="en-US" sz="3600" dirty="0"/>
+              <a:t>This is the “working directory”</a:t>
+            </a:r>
+          </a:p>
+          <a:p>
+            <a:pPr lvl="2"/>
+            <a:r>
+              <a:rPr lang="en-US" sz="3600" dirty="0"/>
+              <a:t>R will look for files here</a:t>
+            </a:r>
+          </a:p>
+          <a:p>
+            <a:pPr lvl="2"/>
+            <a:r>
+              <a:rPr lang="en-US" sz="3600" dirty="0"/>
+              <a:t>R will save files here</a:t>
+            </a:r>
           </a:p>
         </p:txBody>
       </p:sp>
@@ -26720,7 +28093,7 @@
           <p:cNvPr id="4" name="Footer Placeholder 3">
             <a:extLst>
               <a:ext uri="{FF2B5EF4-FFF2-40B4-BE49-F238E27FC236}">
-                <a16:creationId xmlns:a16="http://schemas.microsoft.com/office/drawing/2014/main" id="{BDBA9E97-D4EB-4BC4-9279-4B7EA9BF2E49}"/>
+                <a16:creationId xmlns:a16="http://schemas.microsoft.com/office/drawing/2014/main" id="{50023B57-EA94-47EE-9C2C-ECEB9DBFFFAC}"/>
               </a:ext>
             </a:extLst>
           </p:cNvPr>
@@ -26748,7 +28121,7 @@
           <p:cNvPr id="5" name="Slide Number Placeholder 4">
             <a:extLst>
               <a:ext uri="{FF2B5EF4-FFF2-40B4-BE49-F238E27FC236}">
-                <a16:creationId xmlns:a16="http://schemas.microsoft.com/office/drawing/2014/main" id="{6759996C-B8FC-4B09-993C-B75DADD15BC5}"/>
+                <a16:creationId xmlns:a16="http://schemas.microsoft.com/office/drawing/2014/main" id="{A2582723-E198-4834-89EB-3DED6F5CB4A2}"/>
               </a:ext>
             </a:extLst>
           </p:cNvPr>
@@ -26772,10 +28145,59 @@
           </a:p>
         </p:txBody>
       </p:sp>
+      <p:sp>
+        <p:nvSpPr>
+          <p:cNvPr id="8" name="Rectangle: Rounded Corners 7">
+            <a:extLst>
+              <a:ext uri="{FF2B5EF4-FFF2-40B4-BE49-F238E27FC236}">
+                <a16:creationId xmlns:a16="http://schemas.microsoft.com/office/drawing/2014/main" id="{F1156D37-73E1-4C2F-931B-2D368105B1C7}"/>
+              </a:ext>
+            </a:extLst>
+          </p:cNvPr>
+          <p:cNvSpPr/>
+          <p:nvPr/>
+        </p:nvSpPr>
+        <p:spPr>
+          <a:xfrm>
+            <a:off x="7548880" y="4003040"/>
+            <a:ext cx="3566160" cy="1838960"/>
+          </a:xfrm>
+          <a:prstGeom prst="roundRect">
+            <a:avLst/>
+          </a:prstGeom>
+        </p:spPr>
+        <p:style>
+          <a:lnRef idx="2">
+            <a:schemeClr val="accent1">
+              <a:shade val="50000"/>
+            </a:schemeClr>
+          </a:lnRef>
+          <a:fillRef idx="1">
+            <a:schemeClr val="accent1"/>
+          </a:fillRef>
+          <a:effectRef idx="0">
+            <a:schemeClr val="accent1"/>
+          </a:effectRef>
+          <a:fontRef idx="minor">
+            <a:schemeClr val="lt1"/>
+          </a:fontRef>
+        </p:style>
+        <p:txBody>
+          <a:bodyPr rtlCol="0" anchor="ctr"/>
+          <a:lstStyle/>
+          <a:p>
+            <a:pPr algn="ctr"/>
+            <a:r>
+              <a:rPr lang="en-US" sz="2400" dirty="0"/>
+              <a:t>The files pane of RStudio IDE will display your working directory</a:t>
+            </a:r>
+          </a:p>
+        </p:txBody>
+      </p:sp>
     </p:spTree>
     <p:extLst>
       <p:ext uri="{BB962C8B-B14F-4D97-AF65-F5344CB8AC3E}">
-        <p14:creationId xmlns:p14="http://schemas.microsoft.com/office/powerpoint/2010/main" val="1346999140"/>
+        <p14:creationId xmlns:p14="http://schemas.microsoft.com/office/powerpoint/2010/main" val="163624777"/>
       </p:ext>
     </p:extLst>
   </p:cSld>
@@ -27155,6 +28577,299 @@
           </a:p>
         </p:txBody>
       </p:sp>
+      <p:grpSp>
+        <p:nvGrpSpPr>
+          <p:cNvPr id="9" name="Group 8">
+            <a:extLst>
+              <a:ext uri="{FF2B5EF4-FFF2-40B4-BE49-F238E27FC236}">
+                <a16:creationId xmlns:a16="http://schemas.microsoft.com/office/drawing/2014/main" id="{26783F11-28C1-4650-BC9E-17A0D337A292}"/>
+              </a:ext>
+            </a:extLst>
+          </p:cNvPr>
+          <p:cNvGrpSpPr/>
+          <p:nvPr/>
+        </p:nvGrpSpPr>
+        <p:grpSpPr>
+          <a:xfrm>
+            <a:off x="9064978" y="5441950"/>
+            <a:ext cx="2813307" cy="914400"/>
+            <a:chOff x="9064978" y="5441950"/>
+            <a:chExt cx="2813307" cy="914400"/>
+          </a:xfrm>
+        </p:grpSpPr>
+        <p:sp>
+          <p:nvSpPr>
+            <p:cNvPr id="10" name="Rectangle 9">
+              <a:extLst>
+                <a:ext uri="{FF2B5EF4-FFF2-40B4-BE49-F238E27FC236}">
+                  <a16:creationId xmlns:a16="http://schemas.microsoft.com/office/drawing/2014/main" id="{36508A36-1D70-4EC9-B4A0-0437D940E000}"/>
+                </a:ext>
+              </a:extLst>
+            </p:cNvPr>
+            <p:cNvSpPr/>
+            <p:nvPr/>
+          </p:nvSpPr>
+          <p:spPr>
+            <a:xfrm>
+              <a:off x="9064978" y="5441950"/>
+              <a:ext cx="2813307" cy="914400"/>
+            </a:xfrm>
+            <a:prstGeom prst="rect">
+              <a:avLst/>
+            </a:prstGeom>
+            <a:solidFill>
+              <a:schemeClr val="bg1">
+                <a:lumMod val="95000"/>
+              </a:schemeClr>
+            </a:solidFill>
+            <a:ln>
+              <a:solidFill>
+                <a:schemeClr val="bg1">
+                  <a:lumMod val="65000"/>
+                </a:schemeClr>
+              </a:solidFill>
+            </a:ln>
+          </p:spPr>
+          <p:style>
+            <a:lnRef idx="2">
+              <a:schemeClr val="accent1">
+                <a:shade val="50000"/>
+              </a:schemeClr>
+            </a:lnRef>
+            <a:fillRef idx="1">
+              <a:schemeClr val="accent1"/>
+            </a:fillRef>
+            <a:effectRef idx="0">
+              <a:schemeClr val="accent1"/>
+            </a:effectRef>
+            <a:fontRef idx="minor">
+              <a:schemeClr val="lt1"/>
+            </a:fontRef>
+          </p:style>
+          <p:txBody>
+            <a:bodyPr rtlCol="0" anchor="ctr"/>
+            <a:lstStyle/>
+            <a:p>
+              <a:pPr algn="ctr"/>
+              <a:endParaRPr lang="en-US"/>
+            </a:p>
+          </p:txBody>
+        </p:sp>
+        <p:grpSp>
+          <p:nvGrpSpPr>
+            <p:cNvPr id="11" name="Group 10">
+              <a:extLst>
+                <a:ext uri="{FF2B5EF4-FFF2-40B4-BE49-F238E27FC236}">
+                  <a16:creationId xmlns:a16="http://schemas.microsoft.com/office/drawing/2014/main" id="{6F8112C4-221A-457D-BEF6-4600E964A0E3}"/>
+                </a:ext>
+              </a:extLst>
+            </p:cNvPr>
+            <p:cNvGrpSpPr/>
+            <p:nvPr/>
+          </p:nvGrpSpPr>
+          <p:grpSpPr>
+            <a:xfrm>
+              <a:off x="9164782" y="5441950"/>
+              <a:ext cx="2713503" cy="914400"/>
+              <a:chOff x="9164782" y="5441950"/>
+              <a:chExt cx="2713503" cy="914400"/>
+            </a:xfrm>
+          </p:grpSpPr>
+          <p:pic>
+            <p:nvPicPr>
+              <p:cNvPr id="12" name="Graphic 11" descr="Stopwatch">
+                <a:extLst>
+                  <a:ext uri="{FF2B5EF4-FFF2-40B4-BE49-F238E27FC236}">
+                    <a16:creationId xmlns:a16="http://schemas.microsoft.com/office/drawing/2014/main" id="{F142FC6B-B140-4626-A141-1994CCA587CC}"/>
+                  </a:ext>
+                </a:extLst>
+              </p:cNvPr>
+              <p:cNvPicPr>
+                <a:picLocks noChangeAspect="1"/>
+              </p:cNvPicPr>
+              <p:nvPr/>
+            </p:nvPicPr>
+            <p:blipFill>
+              <a:blip r:embed="rId2">
+                <a:extLst>
+                  <a:ext uri="{28A0092B-C50C-407E-A947-70E740481C1C}">
+                    <a14:useLocalDpi xmlns:a14="http://schemas.microsoft.com/office/drawing/2010/main" val="0"/>
+                  </a:ext>
+                  <a:ext uri="{96DAC541-7B7A-43D3-8B79-37D633B846F1}">
+                    <asvg:svgBlip xmlns:asvg="http://schemas.microsoft.com/office/drawing/2016/SVG/main" r:embed="rId3"/>
+                  </a:ext>
+                </a:extLst>
+              </a:blip>
+              <a:stretch>
+                <a:fillRect/>
+              </a:stretch>
+            </p:blipFill>
+            <p:spPr>
+              <a:xfrm>
+                <a:off x="9164782" y="5441950"/>
+                <a:ext cx="914400" cy="914400"/>
+              </a:xfrm>
+              <a:prstGeom prst="rect">
+                <a:avLst/>
+              </a:prstGeom>
+            </p:spPr>
+          </p:pic>
+          <p:sp>
+            <p:nvSpPr>
+              <p:cNvPr id="13" name="TextBox 12">
+                <a:extLst>
+                  <a:ext uri="{FF2B5EF4-FFF2-40B4-BE49-F238E27FC236}">
+                    <a16:creationId xmlns:a16="http://schemas.microsoft.com/office/drawing/2014/main" id="{DC77EB2A-8A92-4E9B-81E7-8A195CBC8BAA}"/>
+                  </a:ext>
+                </a:extLst>
+              </p:cNvPr>
+              <p:cNvSpPr txBox="1"/>
+              <p:nvPr/>
+            </p:nvSpPr>
+            <p:spPr>
+              <a:xfrm>
+                <a:off x="9958853" y="5586909"/>
+                <a:ext cx="1919432" cy="769441"/>
+              </a:xfrm>
+              <a:prstGeom prst="rect">
+                <a:avLst/>
+              </a:prstGeom>
+              <a:noFill/>
+            </p:spPr>
+            <p:txBody>
+              <a:bodyPr wrap="square" rtlCol="0">
+                <a:spAutoFit/>
+              </a:bodyPr>
+              <a:lstStyle/>
+              <a:p>
+                <a:r>
+                  <a:rPr lang="en-US" sz="4400" dirty="0">
+                    <a:latin typeface="Fira Code" panose="020B0809050000020004" pitchFamily="49" charset="0"/>
+                    <a:ea typeface="Fira Code" panose="020B0809050000020004" pitchFamily="49" charset="0"/>
+                    <a:cs typeface="Fira Code" panose="020B0809050000020004" pitchFamily="49" charset="0"/>
+                  </a:rPr>
+                  <a:t>02:00</a:t>
+                </a:r>
+              </a:p>
+            </p:txBody>
+          </p:sp>
+        </p:grpSp>
+      </p:grpSp>
+      <p:sp>
+        <p:nvSpPr>
+          <p:cNvPr id="2" name="TextBox 1">
+            <a:extLst>
+              <a:ext uri="{FF2B5EF4-FFF2-40B4-BE49-F238E27FC236}">
+                <a16:creationId xmlns:a16="http://schemas.microsoft.com/office/drawing/2014/main" id="{C1DAAEBA-B0C8-4347-8244-BA4854116475}"/>
+              </a:ext>
+            </a:extLst>
+          </p:cNvPr>
+          <p:cNvSpPr txBox="1"/>
+          <p:nvPr/>
+        </p:nvSpPr>
+        <p:spPr>
+          <a:xfrm>
+            <a:off x="838200" y="4899378"/>
+            <a:ext cx="3056467" cy="584775"/>
+          </a:xfrm>
+          <a:prstGeom prst="rect">
+            <a:avLst/>
+          </a:prstGeom>
+          <a:noFill/>
+        </p:spPr>
+        <p:txBody>
+          <a:bodyPr wrap="square" rtlCol="0">
+            <a:spAutoFit/>
+          </a:bodyPr>
+          <a:lstStyle/>
+          <a:p>
+            <a:r>
+              <a:rPr lang="en-US" sz="3200" b="1" dirty="0"/>
+              <a:t>I’m working on it</a:t>
+            </a:r>
+          </a:p>
+        </p:txBody>
+      </p:sp>
+      <p:sp>
+        <p:nvSpPr>
+          <p:cNvPr id="14" name="TextBox 13">
+            <a:extLst>
+              <a:ext uri="{FF2B5EF4-FFF2-40B4-BE49-F238E27FC236}">
+                <a16:creationId xmlns:a16="http://schemas.microsoft.com/office/drawing/2014/main" id="{DF030D69-2958-40B2-8975-C7A6AB91E8BA}"/>
+              </a:ext>
+            </a:extLst>
+          </p:cNvPr>
+          <p:cNvSpPr txBox="1"/>
+          <p:nvPr/>
+        </p:nvSpPr>
+        <p:spPr>
+          <a:xfrm>
+            <a:off x="3927827" y="4899378"/>
+            <a:ext cx="3056467" cy="584775"/>
+          </a:xfrm>
+          <a:prstGeom prst="rect">
+            <a:avLst/>
+          </a:prstGeom>
+          <a:noFill/>
+        </p:spPr>
+        <p:txBody>
+          <a:bodyPr wrap="square" rtlCol="0">
+            <a:spAutoFit/>
+          </a:bodyPr>
+          <a:lstStyle/>
+          <a:p>
+            <a:pPr algn="ctr"/>
+            <a:r>
+              <a:rPr lang="en-US" sz="3200" b="1" dirty="0">
+                <a:highlight>
+                  <a:srgbClr val="FFFF00"/>
+                </a:highlight>
+              </a:rPr>
+              <a:t>I’m stuck! Help!</a:t>
+            </a:r>
+          </a:p>
+        </p:txBody>
+      </p:sp>
+      <p:sp>
+        <p:nvSpPr>
+          <p:cNvPr id="15" name="TextBox 14">
+            <a:extLst>
+              <a:ext uri="{FF2B5EF4-FFF2-40B4-BE49-F238E27FC236}">
+                <a16:creationId xmlns:a16="http://schemas.microsoft.com/office/drawing/2014/main" id="{5E863564-5EF3-49F3-B7D1-348D8258CF2C}"/>
+              </a:ext>
+            </a:extLst>
+          </p:cNvPr>
+          <p:cNvSpPr txBox="1"/>
+          <p:nvPr/>
+        </p:nvSpPr>
+        <p:spPr>
+          <a:xfrm>
+            <a:off x="6905273" y="4899377"/>
+            <a:ext cx="2238022" cy="584775"/>
+          </a:xfrm>
+          <a:prstGeom prst="rect">
+            <a:avLst/>
+          </a:prstGeom>
+          <a:noFill/>
+        </p:spPr>
+        <p:txBody>
+          <a:bodyPr wrap="square" rtlCol="0">
+            <a:spAutoFit/>
+          </a:bodyPr>
+          <a:lstStyle/>
+          <a:p>
+            <a:pPr algn="ctr"/>
+            <a:r>
+              <a:rPr lang="en-US" sz="3200" b="1" dirty="0">
+                <a:solidFill>
+                  <a:schemeClr val="accent4"/>
+                </a:solidFill>
+              </a:rPr>
+              <a:t>I’m done!</a:t>
+            </a:r>
+          </a:p>
+        </p:txBody>
+      </p:sp>
     </p:spTree>
     <p:extLst>
       <p:ext uri="{BB962C8B-B14F-4D97-AF65-F5344CB8AC3E}">
@@ -27165,10 +28880,582 @@
   <p:clrMapOvr>
     <a:masterClrMapping/>
   </p:clrMapOvr>
+  <p:timing>
+    <p:tnLst>
+      <p:par>
+        <p:cTn id="1" dur="indefinite" restart="never" nodeType="tmRoot">
+          <p:childTnLst>
+            <p:seq concurrent="1" nextAc="seek">
+              <p:cTn id="2" dur="indefinite" nodeType="mainSeq">
+                <p:childTnLst>
+                  <p:par>
+                    <p:cTn id="3" fill="hold">
+                      <p:stCondLst>
+                        <p:cond delay="indefinite"/>
+                      </p:stCondLst>
+                      <p:childTnLst>
+                        <p:par>
+                          <p:cTn id="4" fill="hold">
+                            <p:stCondLst>
+                              <p:cond delay="0"/>
+                            </p:stCondLst>
+                            <p:childTnLst>
+                              <p:par>
+                                <p:cTn id="5" presetID="1" presetClass="entr" presetSubtype="0" fill="hold" grpId="0" nodeType="clickEffect">
+                                  <p:stCondLst>
+                                    <p:cond delay="0"/>
+                                  </p:stCondLst>
+                                  <p:childTnLst>
+                                    <p:set>
+                                      <p:cBhvr>
+                                        <p:cTn id="6" dur="1" fill="hold">
+                                          <p:stCondLst>
+                                            <p:cond delay="0"/>
+                                          </p:stCondLst>
+                                        </p:cTn>
+                                        <p:tgtEl>
+                                          <p:spTgt spid="2"/>
+                                        </p:tgtEl>
+                                        <p:attrNameLst>
+                                          <p:attrName>style.visibility</p:attrName>
+                                        </p:attrNameLst>
+                                      </p:cBhvr>
+                                      <p:to>
+                                        <p:strVal val="visible"/>
+                                      </p:to>
+                                    </p:set>
+                                  </p:childTnLst>
+                                </p:cTn>
+                              </p:par>
+                              <p:par>
+                                <p:cTn id="7" presetID="1" presetClass="entr" presetSubtype="0" fill="hold" grpId="0" nodeType="withEffect">
+                                  <p:stCondLst>
+                                    <p:cond delay="0"/>
+                                  </p:stCondLst>
+                                  <p:childTnLst>
+                                    <p:set>
+                                      <p:cBhvr>
+                                        <p:cTn id="8" dur="1" fill="hold">
+                                          <p:stCondLst>
+                                            <p:cond delay="0"/>
+                                          </p:stCondLst>
+                                        </p:cTn>
+                                        <p:tgtEl>
+                                          <p:spTgt spid="14"/>
+                                        </p:tgtEl>
+                                        <p:attrNameLst>
+                                          <p:attrName>style.visibility</p:attrName>
+                                        </p:attrNameLst>
+                                      </p:cBhvr>
+                                      <p:to>
+                                        <p:strVal val="visible"/>
+                                      </p:to>
+                                    </p:set>
+                                  </p:childTnLst>
+                                </p:cTn>
+                              </p:par>
+                              <p:par>
+                                <p:cTn id="9" presetID="1" presetClass="entr" presetSubtype="0" fill="hold" grpId="0" nodeType="withEffect">
+                                  <p:stCondLst>
+                                    <p:cond delay="0"/>
+                                  </p:stCondLst>
+                                  <p:childTnLst>
+                                    <p:set>
+                                      <p:cBhvr>
+                                        <p:cTn id="10" dur="1" fill="hold">
+                                          <p:stCondLst>
+                                            <p:cond delay="0"/>
+                                          </p:stCondLst>
+                                        </p:cTn>
+                                        <p:tgtEl>
+                                          <p:spTgt spid="15"/>
+                                        </p:tgtEl>
+                                        <p:attrNameLst>
+                                          <p:attrName>style.visibility</p:attrName>
+                                        </p:attrNameLst>
+                                      </p:cBhvr>
+                                      <p:to>
+                                        <p:strVal val="visible"/>
+                                      </p:to>
+                                    </p:set>
+                                  </p:childTnLst>
+                                </p:cTn>
+                              </p:par>
+                            </p:childTnLst>
+                          </p:cTn>
+                        </p:par>
+                      </p:childTnLst>
+                    </p:cTn>
+                  </p:par>
+                </p:childTnLst>
+              </p:cTn>
+              <p:prevCondLst>
+                <p:cond evt="onPrev" delay="0">
+                  <p:tgtEl>
+                    <p:sldTgt/>
+                  </p:tgtEl>
+                </p:cond>
+              </p:prevCondLst>
+              <p:nextCondLst>
+                <p:cond evt="onNext" delay="0">
+                  <p:tgtEl>
+                    <p:sldTgt/>
+                  </p:tgtEl>
+                </p:cond>
+              </p:nextCondLst>
+            </p:seq>
+          </p:childTnLst>
+        </p:cTn>
+      </p:par>
+    </p:tnLst>
+    <p:bldLst>
+      <p:bldP spid="2" grpId="0"/>
+      <p:bldP spid="14" grpId="0"/>
+      <p:bldP spid="15" grpId="0"/>
+    </p:bldLst>
+  </p:timing>
 </p:sld>
 </file>
 
 <file path=ppt/slides/slide70.xml><?xml version="1.0" encoding="utf-8"?>
+<p:sld xmlns:a="http://schemas.openxmlformats.org/drawingml/2006/main" xmlns:r="http://schemas.openxmlformats.org/officeDocument/2006/relationships" xmlns:p="http://schemas.openxmlformats.org/presentationml/2006/main">
+  <p:cSld>
+    <p:spTree>
+      <p:nvGrpSpPr>
+        <p:cNvPr id="1" name=""/>
+        <p:cNvGrpSpPr/>
+        <p:nvPr/>
+      </p:nvGrpSpPr>
+      <p:grpSpPr>
+        <a:xfrm>
+          <a:off x="0" y="0"/>
+          <a:ext cx="0" cy="0"/>
+          <a:chOff x="0" y="0"/>
+          <a:chExt cx="0" cy="0"/>
+        </a:xfrm>
+      </p:grpSpPr>
+      <p:sp>
+        <p:nvSpPr>
+          <p:cNvPr id="2" name="Title 1">
+            <a:extLst>
+              <a:ext uri="{FF2B5EF4-FFF2-40B4-BE49-F238E27FC236}">
+                <a16:creationId xmlns:a16="http://schemas.microsoft.com/office/drawing/2014/main" id="{151FF821-05CE-41E9-98CE-75AAA7D9FB79}"/>
+              </a:ext>
+            </a:extLst>
+          </p:cNvPr>
+          <p:cNvSpPr>
+            <a:spLocks noGrp="1"/>
+          </p:cNvSpPr>
+          <p:nvPr>
+            <p:ph type="title"/>
+          </p:nvPr>
+        </p:nvSpPr>
+        <p:spPr/>
+        <p:txBody>
+          <a:bodyPr/>
+          <a:lstStyle/>
+          <a:p>
+            <a:pPr algn="ctr"/>
+            <a:r>
+              <a:rPr lang="en-US" dirty="0"/>
+              <a:t>Saving plots</a:t>
+            </a:r>
+          </a:p>
+        </p:txBody>
+      </p:sp>
+      <p:sp>
+        <p:nvSpPr>
+          <p:cNvPr id="3" name="Content Placeholder 2">
+            <a:extLst>
+              <a:ext uri="{FF2B5EF4-FFF2-40B4-BE49-F238E27FC236}">
+                <a16:creationId xmlns:a16="http://schemas.microsoft.com/office/drawing/2014/main" id="{934BB3BB-0680-4BDE-9CC2-01CA273BA8EC}"/>
+              </a:ext>
+            </a:extLst>
+          </p:cNvPr>
+          <p:cNvSpPr>
+            <a:spLocks noGrp="1"/>
+          </p:cNvSpPr>
+          <p:nvPr>
+            <p:ph idx="1"/>
+          </p:nvPr>
+        </p:nvSpPr>
+        <p:spPr>
+          <a:xfrm>
+            <a:off x="838200" y="1825625"/>
+            <a:ext cx="10835640" cy="4351338"/>
+          </a:xfrm>
+        </p:spPr>
+        <p:txBody>
+          <a:bodyPr>
+            <a:normAutofit fontScale="92500" lnSpcReduction="20000"/>
+          </a:bodyPr>
+          <a:lstStyle/>
+          <a:p>
+            <a:pPr marL="0" indent="0">
+              <a:buNone/>
+            </a:pPr>
+            <a:r>
+              <a:rPr lang="en-US" dirty="0"/>
+              <a:t> </a:t>
+            </a:r>
+            <a:r>
+              <a:rPr lang="en-US" dirty="0" err="1">
+                <a:solidFill>
+                  <a:schemeClr val="accent6">
+                    <a:lumMod val="75000"/>
+                  </a:schemeClr>
+                </a:solidFill>
+                <a:latin typeface="Fira Code" panose="020B0809050000020004" pitchFamily="49" charset="0"/>
+                <a:ea typeface="Fira Code" panose="020B0809050000020004" pitchFamily="49" charset="0"/>
+                <a:cs typeface="Fira Code" panose="020B0809050000020004" pitchFamily="49" charset="0"/>
+              </a:rPr>
+              <a:t>ggsave</a:t>
+            </a:r>
+            <a:r>
+              <a:rPr lang="en-US" dirty="0">
+                <a:solidFill>
+                  <a:schemeClr val="accent6">
+                    <a:lumMod val="75000"/>
+                  </a:schemeClr>
+                </a:solidFill>
+                <a:latin typeface="Fira Code" panose="020B0809050000020004" pitchFamily="49" charset="0"/>
+                <a:ea typeface="Fira Code" panose="020B0809050000020004" pitchFamily="49" charset="0"/>
+                <a:cs typeface="Fira Code" panose="020B0809050000020004" pitchFamily="49" charset="0"/>
+              </a:rPr>
+              <a:t>() </a:t>
+            </a:r>
+            <a:r>
+              <a:rPr lang="en-US" sz="3500" dirty="0"/>
+              <a:t>will save the last plot.</a:t>
+            </a:r>
+          </a:p>
+          <a:p>
+            <a:pPr marL="0" indent="0">
+              <a:buNone/>
+            </a:pPr>
+            <a:r>
+              <a:rPr lang="en-US" sz="2400" dirty="0">
+                <a:latin typeface="Fira Code" panose="020B0809050000020004" pitchFamily="49" charset="0"/>
+                <a:ea typeface="Fira Code" panose="020B0809050000020004" pitchFamily="49" charset="0"/>
+                <a:cs typeface="Fira Code" panose="020B0809050000020004" pitchFamily="49" charset="0"/>
+              </a:rPr>
+              <a:t>   </a:t>
+            </a:r>
+            <a:r>
+              <a:rPr lang="en-US" sz="2400" dirty="0" err="1">
+                <a:latin typeface="Fira Code" panose="020B0809050000020004" pitchFamily="49" charset="0"/>
+                <a:ea typeface="Fira Code" panose="020B0809050000020004" pitchFamily="49" charset="0"/>
+                <a:cs typeface="Fira Code" panose="020B0809050000020004" pitchFamily="49" charset="0"/>
+              </a:rPr>
+              <a:t>ggsave</a:t>
+            </a:r>
+            <a:r>
+              <a:rPr lang="en-US" sz="2400" dirty="0">
+                <a:latin typeface="Fira Code" panose="020B0809050000020004" pitchFamily="49" charset="0"/>
+                <a:ea typeface="Fira Code" panose="020B0809050000020004" pitchFamily="49" charset="0"/>
+                <a:cs typeface="Fira Code" panose="020B0809050000020004" pitchFamily="49" charset="0"/>
+              </a:rPr>
+              <a:t>(“my-first-plot</a:t>
+            </a:r>
+            <a:r>
+              <a:rPr lang="en-US" sz="2400" dirty="0">
+                <a:solidFill>
+                  <a:schemeClr val="accent6">
+                    <a:lumMod val="75000"/>
+                  </a:schemeClr>
+                </a:solidFill>
+                <a:latin typeface="Fira Code" panose="020B0809050000020004" pitchFamily="49" charset="0"/>
+                <a:ea typeface="Fira Code" panose="020B0809050000020004" pitchFamily="49" charset="0"/>
+                <a:cs typeface="Fira Code" panose="020B0809050000020004" pitchFamily="49" charset="0"/>
+              </a:rPr>
+              <a:t>.png</a:t>
+            </a:r>
+            <a:r>
+              <a:rPr lang="en-US" sz="2400" dirty="0">
+                <a:latin typeface="Fira Code" panose="020B0809050000020004" pitchFamily="49" charset="0"/>
+                <a:ea typeface="Fira Code" panose="020B0809050000020004" pitchFamily="49" charset="0"/>
+                <a:cs typeface="Fira Code" panose="020B0809050000020004" pitchFamily="49" charset="0"/>
+              </a:rPr>
+              <a:t>”)</a:t>
+            </a:r>
+          </a:p>
+          <a:p>
+            <a:pPr marL="0" indent="0">
+              <a:buNone/>
+            </a:pPr>
+            <a:r>
+              <a:rPr lang="en-US" sz="2400" dirty="0">
+                <a:latin typeface="Fira Code" panose="020B0809050000020004" pitchFamily="49" charset="0"/>
+                <a:ea typeface="Fira Code" panose="020B0809050000020004" pitchFamily="49" charset="0"/>
+                <a:cs typeface="Fira Code" panose="020B0809050000020004" pitchFamily="49" charset="0"/>
+              </a:rPr>
+              <a:t>   </a:t>
+            </a:r>
+            <a:r>
+              <a:rPr lang="en-US" sz="2400" dirty="0" err="1">
+                <a:latin typeface="Fira Code" panose="020B0809050000020004" pitchFamily="49" charset="0"/>
+                <a:ea typeface="Fira Code" panose="020B0809050000020004" pitchFamily="49" charset="0"/>
+                <a:cs typeface="Fira Code" panose="020B0809050000020004" pitchFamily="49" charset="0"/>
+              </a:rPr>
+              <a:t>ggsave</a:t>
+            </a:r>
+            <a:r>
+              <a:rPr lang="en-US" sz="2400" dirty="0">
+                <a:latin typeface="Fira Code" panose="020B0809050000020004" pitchFamily="49" charset="0"/>
+                <a:ea typeface="Fira Code" panose="020B0809050000020004" pitchFamily="49" charset="0"/>
+                <a:cs typeface="Fira Code" panose="020B0809050000020004" pitchFamily="49" charset="0"/>
+              </a:rPr>
+              <a:t>(“my-first-plot</a:t>
+            </a:r>
+            <a:r>
+              <a:rPr lang="en-US" sz="2400" dirty="0">
+                <a:solidFill>
+                  <a:schemeClr val="accent6">
+                    <a:lumMod val="75000"/>
+                  </a:schemeClr>
+                </a:solidFill>
+                <a:latin typeface="Fira Code" panose="020B0809050000020004" pitchFamily="49" charset="0"/>
+                <a:ea typeface="Fira Code" panose="020B0809050000020004" pitchFamily="49" charset="0"/>
+                <a:cs typeface="Fira Code" panose="020B0809050000020004" pitchFamily="49" charset="0"/>
+              </a:rPr>
+              <a:t>.tiff</a:t>
+            </a:r>
+            <a:r>
+              <a:rPr lang="en-US" sz="2400" dirty="0">
+                <a:latin typeface="Fira Code" panose="020B0809050000020004" pitchFamily="49" charset="0"/>
+                <a:ea typeface="Fira Code" panose="020B0809050000020004" pitchFamily="49" charset="0"/>
+                <a:cs typeface="Fira Code" panose="020B0809050000020004" pitchFamily="49" charset="0"/>
+              </a:rPr>
+              <a:t>”)</a:t>
+            </a:r>
+          </a:p>
+          <a:p>
+            <a:pPr marL="0" indent="0">
+              <a:buNone/>
+            </a:pPr>
+            <a:endParaRPr lang="en-US" sz="3500" dirty="0"/>
+          </a:p>
+          <a:p>
+            <a:pPr marL="0" indent="0">
+              <a:buNone/>
+            </a:pPr>
+            <a:r>
+              <a:rPr lang="en-US" sz="3500" dirty="0"/>
+              <a:t>You can further specify size:</a:t>
+            </a:r>
+          </a:p>
+          <a:p>
+            <a:pPr marL="0" indent="0">
+              <a:buNone/>
+            </a:pPr>
+            <a:r>
+              <a:rPr lang="en-US" sz="2400" dirty="0">
+                <a:latin typeface="Fira Code" panose="020B0809050000020004" pitchFamily="49" charset="0"/>
+                <a:ea typeface="Fira Code" panose="020B0809050000020004" pitchFamily="49" charset="0"/>
+                <a:cs typeface="Fira Code" panose="020B0809050000020004" pitchFamily="49" charset="0"/>
+              </a:rPr>
+              <a:t>   </a:t>
+            </a:r>
+            <a:r>
+              <a:rPr lang="en-US" sz="2400" dirty="0" err="1">
+                <a:latin typeface="Fira Code" panose="020B0809050000020004" pitchFamily="49" charset="0"/>
+                <a:ea typeface="Fira Code" panose="020B0809050000020004" pitchFamily="49" charset="0"/>
+                <a:cs typeface="Fira Code" panose="020B0809050000020004" pitchFamily="49" charset="0"/>
+              </a:rPr>
+              <a:t>ggsave</a:t>
+            </a:r>
+            <a:r>
+              <a:rPr lang="en-US" sz="2400" dirty="0">
+                <a:latin typeface="Fira Code" panose="020B0809050000020004" pitchFamily="49" charset="0"/>
+                <a:ea typeface="Fira Code" panose="020B0809050000020004" pitchFamily="49" charset="0"/>
+                <a:cs typeface="Fira Code" panose="020B0809050000020004" pitchFamily="49" charset="0"/>
+              </a:rPr>
+              <a:t>(“my-first-plot.png”, </a:t>
+            </a:r>
+            <a:r>
+              <a:rPr lang="en-US" sz="2400" dirty="0">
+                <a:solidFill>
+                  <a:schemeClr val="accent6">
+                    <a:lumMod val="75000"/>
+                  </a:schemeClr>
+                </a:solidFill>
+                <a:latin typeface="Fira Code" panose="020B0809050000020004" pitchFamily="49" charset="0"/>
+                <a:ea typeface="Fira Code" panose="020B0809050000020004" pitchFamily="49" charset="0"/>
+                <a:cs typeface="Fira Code" panose="020B0809050000020004" pitchFamily="49" charset="0"/>
+              </a:rPr>
+              <a:t>height = 6, width = 8,</a:t>
+            </a:r>
+          </a:p>
+          <a:p>
+            <a:pPr marL="0" indent="0">
+              <a:buNone/>
+            </a:pPr>
+            <a:r>
+              <a:rPr lang="en-US" sz="2400" dirty="0">
+                <a:solidFill>
+                  <a:schemeClr val="accent6">
+                    <a:lumMod val="75000"/>
+                  </a:schemeClr>
+                </a:solidFill>
+                <a:latin typeface="Fira Code" panose="020B0809050000020004" pitchFamily="49" charset="0"/>
+                <a:ea typeface="Fira Code" panose="020B0809050000020004" pitchFamily="49" charset="0"/>
+                <a:cs typeface="Fira Code" panose="020B0809050000020004" pitchFamily="49" charset="0"/>
+              </a:rPr>
+              <a:t>           units = “cm”</a:t>
+            </a:r>
+            <a:r>
+              <a:rPr lang="en-US" sz="2400" dirty="0">
+                <a:latin typeface="Fira Code" panose="020B0809050000020004" pitchFamily="49" charset="0"/>
+                <a:ea typeface="Fira Code" panose="020B0809050000020004" pitchFamily="49" charset="0"/>
+                <a:cs typeface="Fira Code" panose="020B0809050000020004" pitchFamily="49" charset="0"/>
+              </a:rPr>
+              <a:t>)</a:t>
+            </a:r>
+            <a:endParaRPr lang="en-US" dirty="0">
+              <a:latin typeface="Fira Code" panose="020B0809050000020004" pitchFamily="49" charset="0"/>
+              <a:ea typeface="Fira Code" panose="020B0809050000020004" pitchFamily="49" charset="0"/>
+              <a:cs typeface="Fira Code" panose="020B0809050000020004" pitchFamily="49" charset="0"/>
+            </a:endParaRPr>
+          </a:p>
+          <a:p>
+            <a:pPr marL="0" indent="0">
+              <a:buNone/>
+            </a:pPr>
+            <a:endParaRPr lang="en-US" dirty="0"/>
+          </a:p>
+          <a:p>
+            <a:pPr marL="0" indent="0">
+              <a:buNone/>
+            </a:pPr>
+            <a:r>
+              <a:rPr lang="en-US" sz="3500" dirty="0"/>
+              <a:t>Or even resolution:</a:t>
+            </a:r>
+          </a:p>
+          <a:p>
+            <a:pPr marL="0" indent="0">
+              <a:buNone/>
+            </a:pPr>
+            <a:r>
+              <a:rPr lang="en-US" dirty="0"/>
+              <a:t>	</a:t>
+            </a:r>
+            <a:r>
+              <a:rPr lang="en-US" sz="2400" dirty="0" err="1">
+                <a:latin typeface="Fira Code" panose="020B0809050000020004" pitchFamily="49" charset="0"/>
+                <a:ea typeface="Fira Code" panose="020B0809050000020004" pitchFamily="49" charset="0"/>
+                <a:cs typeface="Fira Code" panose="020B0809050000020004" pitchFamily="49" charset="0"/>
+              </a:rPr>
+              <a:t>ggsave</a:t>
+            </a:r>
+            <a:r>
+              <a:rPr lang="en-US" sz="2400" dirty="0">
+                <a:latin typeface="Fira Code" panose="020B0809050000020004" pitchFamily="49" charset="0"/>
+                <a:ea typeface="Fira Code" panose="020B0809050000020004" pitchFamily="49" charset="0"/>
+                <a:cs typeface="Fira Code" panose="020B0809050000020004" pitchFamily="49" charset="0"/>
+              </a:rPr>
+              <a:t>(“my-first-plot.png”, </a:t>
+            </a:r>
+            <a:r>
+              <a:rPr lang="en-US" sz="2400" dirty="0">
+                <a:solidFill>
+                  <a:schemeClr val="accent6">
+                    <a:lumMod val="75000"/>
+                  </a:schemeClr>
+                </a:solidFill>
+                <a:latin typeface="Fira Code" panose="020B0809050000020004" pitchFamily="49" charset="0"/>
+                <a:ea typeface="Fira Code" panose="020B0809050000020004" pitchFamily="49" charset="0"/>
+                <a:cs typeface="Fira Code" panose="020B0809050000020004" pitchFamily="49" charset="0"/>
+              </a:rPr>
+              <a:t>dpi = 300</a:t>
+            </a:r>
+            <a:r>
+              <a:rPr lang="en-US" sz="2400" dirty="0">
+                <a:latin typeface="Fira Code" panose="020B0809050000020004" pitchFamily="49" charset="0"/>
+                <a:ea typeface="Fira Code" panose="020B0809050000020004" pitchFamily="49" charset="0"/>
+                <a:cs typeface="Fira Code" panose="020B0809050000020004" pitchFamily="49" charset="0"/>
+              </a:rPr>
+              <a:t>)</a:t>
+            </a:r>
+            <a:endParaRPr lang="en-US" dirty="0">
+              <a:latin typeface="Fira Code" panose="020B0809050000020004" pitchFamily="49" charset="0"/>
+              <a:ea typeface="Fira Code" panose="020B0809050000020004" pitchFamily="49" charset="0"/>
+              <a:cs typeface="Fira Code" panose="020B0809050000020004" pitchFamily="49" charset="0"/>
+            </a:endParaRPr>
+          </a:p>
+        </p:txBody>
+      </p:sp>
+      <p:sp>
+        <p:nvSpPr>
+          <p:cNvPr id="4" name="Footer Placeholder 3">
+            <a:extLst>
+              <a:ext uri="{FF2B5EF4-FFF2-40B4-BE49-F238E27FC236}">
+                <a16:creationId xmlns:a16="http://schemas.microsoft.com/office/drawing/2014/main" id="{BDBA9E97-D4EB-4BC4-9279-4B7EA9BF2E49}"/>
+              </a:ext>
+            </a:extLst>
+          </p:cNvPr>
+          <p:cNvSpPr>
+            <a:spLocks noGrp="1"/>
+          </p:cNvSpPr>
+          <p:nvPr>
+            <p:ph type="ftr" sz="quarter" idx="11"/>
+          </p:nvPr>
+        </p:nvSpPr>
+        <p:spPr/>
+        <p:txBody>
+          <a:bodyPr/>
+          <a:lstStyle/>
+          <a:p>
+            <a:r>
+              <a:rPr lang="en-US"/>
+              <a:t>CERF 2019 | The Next Step with R | Cressman and Dunnigan</a:t>
+            </a:r>
+          </a:p>
+        </p:txBody>
+      </p:sp>
+      <p:sp>
+        <p:nvSpPr>
+          <p:cNvPr id="5" name="Slide Number Placeholder 4">
+            <a:extLst>
+              <a:ext uri="{FF2B5EF4-FFF2-40B4-BE49-F238E27FC236}">
+                <a16:creationId xmlns:a16="http://schemas.microsoft.com/office/drawing/2014/main" id="{6759996C-B8FC-4B09-993C-B75DADD15BC5}"/>
+              </a:ext>
+            </a:extLst>
+          </p:cNvPr>
+          <p:cNvSpPr>
+            <a:spLocks noGrp="1"/>
+          </p:cNvSpPr>
+          <p:nvPr>
+            <p:ph type="sldNum" sz="quarter" idx="12"/>
+          </p:nvPr>
+        </p:nvSpPr>
+        <p:spPr/>
+        <p:txBody>
+          <a:bodyPr/>
+          <a:lstStyle/>
+          <a:p>
+            <a:fld id="{1D07C8D9-AA71-438D-86BE-7B86F7F29DC7}" type="slidenum">
+              <a:rPr lang="en-US" smtClean="0"/>
+              <a:t>70</a:t>
+            </a:fld>
+            <a:endParaRPr lang="en-US"/>
+          </a:p>
+        </p:txBody>
+      </p:sp>
+    </p:spTree>
+    <p:extLst>
+      <p:ext uri="{BB962C8B-B14F-4D97-AF65-F5344CB8AC3E}">
+        <p14:creationId xmlns:p14="http://schemas.microsoft.com/office/powerpoint/2010/main" val="1346999140"/>
+      </p:ext>
+    </p:extLst>
+  </p:cSld>
+  <p:clrMapOvr>
+    <a:masterClrMapping/>
+  </p:clrMapOvr>
+</p:sld>
+</file>
+
+<file path=ppt/slides/slide71.xml><?xml version="1.0" encoding="utf-8"?>
 <p:sld xmlns:a="http://schemas.openxmlformats.org/drawingml/2006/main" xmlns:r="http://schemas.openxmlformats.org/officeDocument/2006/relationships" xmlns:p="http://schemas.openxmlformats.org/presentationml/2006/main">
   <p:cSld>
     <p:bg>
@@ -27324,7 +29611,7 @@
           <a:p>
             <a:fld id="{1D07C8D9-AA71-438D-86BE-7B86F7F29DC7}" type="slidenum">
               <a:rPr lang="en-US" smtClean="0"/>
-              <a:t>70</a:t>
+              <a:t>71</a:t>
             </a:fld>
             <a:endParaRPr lang="en-US"/>
           </a:p>
@@ -27360,6 +29647,184 @@
           </a:prstGeom>
         </p:spPr>
       </p:pic>
+      <p:grpSp>
+        <p:nvGrpSpPr>
+          <p:cNvPr id="7" name="Group 6">
+            <a:extLst>
+              <a:ext uri="{FF2B5EF4-FFF2-40B4-BE49-F238E27FC236}">
+                <a16:creationId xmlns:a16="http://schemas.microsoft.com/office/drawing/2014/main" id="{3B222A41-5487-414F-B638-C289636C57D8}"/>
+              </a:ext>
+            </a:extLst>
+          </p:cNvPr>
+          <p:cNvGrpSpPr/>
+          <p:nvPr/>
+        </p:nvGrpSpPr>
+        <p:grpSpPr>
+          <a:xfrm>
+            <a:off x="9064978" y="5441950"/>
+            <a:ext cx="2813307" cy="914400"/>
+            <a:chOff x="9064978" y="5441950"/>
+            <a:chExt cx="2813307" cy="914400"/>
+          </a:xfrm>
+        </p:grpSpPr>
+        <p:sp>
+          <p:nvSpPr>
+            <p:cNvPr id="8" name="Rectangle 7">
+              <a:extLst>
+                <a:ext uri="{FF2B5EF4-FFF2-40B4-BE49-F238E27FC236}">
+                  <a16:creationId xmlns:a16="http://schemas.microsoft.com/office/drawing/2014/main" id="{0490C223-235E-4985-96DA-9B8C3D87A927}"/>
+                </a:ext>
+              </a:extLst>
+            </p:cNvPr>
+            <p:cNvSpPr/>
+            <p:nvPr/>
+          </p:nvSpPr>
+          <p:spPr>
+            <a:xfrm>
+              <a:off x="9064978" y="5441950"/>
+              <a:ext cx="2813307" cy="914400"/>
+            </a:xfrm>
+            <a:prstGeom prst="rect">
+              <a:avLst/>
+            </a:prstGeom>
+            <a:solidFill>
+              <a:schemeClr val="bg1">
+                <a:lumMod val="95000"/>
+              </a:schemeClr>
+            </a:solidFill>
+            <a:ln>
+              <a:solidFill>
+                <a:schemeClr val="bg1">
+                  <a:lumMod val="65000"/>
+                </a:schemeClr>
+              </a:solidFill>
+            </a:ln>
+          </p:spPr>
+          <p:style>
+            <a:lnRef idx="2">
+              <a:schemeClr val="accent1">
+                <a:shade val="50000"/>
+              </a:schemeClr>
+            </a:lnRef>
+            <a:fillRef idx="1">
+              <a:schemeClr val="accent1"/>
+            </a:fillRef>
+            <a:effectRef idx="0">
+              <a:schemeClr val="accent1"/>
+            </a:effectRef>
+            <a:fontRef idx="minor">
+              <a:schemeClr val="lt1"/>
+            </a:fontRef>
+          </p:style>
+          <p:txBody>
+            <a:bodyPr rtlCol="0" anchor="ctr"/>
+            <a:lstStyle/>
+            <a:p>
+              <a:pPr algn="ctr"/>
+              <a:endParaRPr lang="en-US"/>
+            </a:p>
+          </p:txBody>
+        </p:sp>
+        <p:grpSp>
+          <p:nvGrpSpPr>
+            <p:cNvPr id="9" name="Group 8">
+              <a:extLst>
+                <a:ext uri="{FF2B5EF4-FFF2-40B4-BE49-F238E27FC236}">
+                  <a16:creationId xmlns:a16="http://schemas.microsoft.com/office/drawing/2014/main" id="{7EE775FE-C7D4-4E0F-9431-9499804618B2}"/>
+                </a:ext>
+              </a:extLst>
+            </p:cNvPr>
+            <p:cNvGrpSpPr/>
+            <p:nvPr/>
+          </p:nvGrpSpPr>
+          <p:grpSpPr>
+            <a:xfrm>
+              <a:off x="9164782" y="5441950"/>
+              <a:ext cx="2713503" cy="914400"/>
+              <a:chOff x="9164782" y="5441950"/>
+              <a:chExt cx="2713503" cy="914400"/>
+            </a:xfrm>
+          </p:grpSpPr>
+          <p:pic>
+            <p:nvPicPr>
+              <p:cNvPr id="10" name="Graphic 9" descr="Stopwatch">
+                <a:extLst>
+                  <a:ext uri="{FF2B5EF4-FFF2-40B4-BE49-F238E27FC236}">
+                    <a16:creationId xmlns:a16="http://schemas.microsoft.com/office/drawing/2014/main" id="{A10F9909-C5A5-48C7-8FC4-77B55FC68C11}"/>
+                  </a:ext>
+                </a:extLst>
+              </p:cNvPr>
+              <p:cNvPicPr>
+                <a:picLocks noChangeAspect="1"/>
+              </p:cNvPicPr>
+              <p:nvPr/>
+            </p:nvPicPr>
+            <p:blipFill>
+              <a:blip r:embed="rId3">
+                <a:extLst>
+                  <a:ext uri="{28A0092B-C50C-407E-A947-70E740481C1C}">
+                    <a14:useLocalDpi xmlns:a14="http://schemas.microsoft.com/office/drawing/2010/main" val="0"/>
+                  </a:ext>
+                  <a:ext uri="{96DAC541-7B7A-43D3-8B79-37D633B846F1}">
+                    <asvg:svgBlip xmlns:asvg="http://schemas.microsoft.com/office/drawing/2016/SVG/main" r:embed="rId4"/>
+                  </a:ext>
+                </a:extLst>
+              </a:blip>
+              <a:stretch>
+                <a:fillRect/>
+              </a:stretch>
+            </p:blipFill>
+            <p:spPr>
+              <a:xfrm>
+                <a:off x="9164782" y="5441950"/>
+                <a:ext cx="914400" cy="914400"/>
+              </a:xfrm>
+              <a:prstGeom prst="rect">
+                <a:avLst/>
+              </a:prstGeom>
+            </p:spPr>
+          </p:pic>
+          <p:sp>
+            <p:nvSpPr>
+              <p:cNvPr id="11" name="TextBox 10">
+                <a:extLst>
+                  <a:ext uri="{FF2B5EF4-FFF2-40B4-BE49-F238E27FC236}">
+                    <a16:creationId xmlns:a16="http://schemas.microsoft.com/office/drawing/2014/main" id="{FC9B1D39-96C2-4865-893C-AB41B48CE45A}"/>
+                  </a:ext>
+                </a:extLst>
+              </p:cNvPr>
+              <p:cNvSpPr txBox="1"/>
+              <p:nvPr/>
+            </p:nvSpPr>
+            <p:spPr>
+              <a:xfrm>
+                <a:off x="9958853" y="5586909"/>
+                <a:ext cx="1919432" cy="769441"/>
+              </a:xfrm>
+              <a:prstGeom prst="rect">
+                <a:avLst/>
+              </a:prstGeom>
+              <a:noFill/>
+            </p:spPr>
+            <p:txBody>
+              <a:bodyPr wrap="square" rtlCol="0">
+                <a:spAutoFit/>
+              </a:bodyPr>
+              <a:lstStyle/>
+              <a:p>
+                <a:r>
+                  <a:rPr lang="en-US" sz="4400" dirty="0">
+                    <a:latin typeface="Fira Code" panose="020B0809050000020004" pitchFamily="49" charset="0"/>
+                    <a:ea typeface="Fira Code" panose="020B0809050000020004" pitchFamily="49" charset="0"/>
+                    <a:cs typeface="Fira Code" panose="020B0809050000020004" pitchFamily="49" charset="0"/>
+                  </a:rPr>
+                  <a:t>01:00</a:t>
+                </a:r>
+              </a:p>
+            </p:txBody>
+          </p:sp>
+        </p:grpSp>
+      </p:grpSp>
     </p:spTree>
     <p:extLst>
       <p:ext uri="{BB962C8B-B14F-4D97-AF65-F5344CB8AC3E}">
@@ -27373,7 +29838,7 @@
 </p:sld>
 </file>
 
-<file path=ppt/slides/slide71.xml><?xml version="1.0" encoding="utf-8"?>
+<file path=ppt/slides/slide72.xml><?xml version="1.0" encoding="utf-8"?>
 <p:sld xmlns:a="http://schemas.openxmlformats.org/drawingml/2006/main" xmlns:r="http://schemas.openxmlformats.org/officeDocument/2006/relationships" xmlns:p="http://schemas.openxmlformats.org/presentationml/2006/main">
   <p:cSld>
     <p:spTree>
@@ -27475,7 +29940,7 @@
           <a:p>
             <a:fld id="{1D07C8D9-AA71-438D-86BE-7B86F7F29DC7}" type="slidenum">
               <a:rPr lang="en-US" smtClean="0"/>
-              <a:t>71</a:t>
+              <a:t>72</a:t>
             </a:fld>
             <a:endParaRPr lang="en-US"/>
           </a:p>
@@ -27784,7 +30249,7 @@
 </p:sld>
 </file>
 
-<file path=ppt/slides/slide72.xml><?xml version="1.0" encoding="utf-8"?>
+<file path=ppt/slides/slide73.xml><?xml version="1.0" encoding="utf-8"?>
 <p:sld xmlns:a="http://schemas.openxmlformats.org/drawingml/2006/main" xmlns:r="http://schemas.openxmlformats.org/officeDocument/2006/relationships" xmlns:p="http://schemas.openxmlformats.org/presentationml/2006/main">
   <p:cSld>
     <p:bg>
@@ -28037,12 +30502,190 @@
           <a:p>
             <a:fld id="{1D07C8D9-AA71-438D-86BE-7B86F7F29DC7}" type="slidenum">
               <a:rPr lang="en-US" smtClean="0"/>
-              <a:t>72</a:t>
+              <a:t>73</a:t>
             </a:fld>
             <a:endParaRPr lang="en-US"/>
           </a:p>
         </p:txBody>
       </p:sp>
+      <p:grpSp>
+        <p:nvGrpSpPr>
+          <p:cNvPr id="6" name="Group 5">
+            <a:extLst>
+              <a:ext uri="{FF2B5EF4-FFF2-40B4-BE49-F238E27FC236}">
+                <a16:creationId xmlns:a16="http://schemas.microsoft.com/office/drawing/2014/main" id="{ED55DEA1-B5E1-4DDE-A0ED-F88466556A8E}"/>
+              </a:ext>
+            </a:extLst>
+          </p:cNvPr>
+          <p:cNvGrpSpPr/>
+          <p:nvPr/>
+        </p:nvGrpSpPr>
+        <p:grpSpPr>
+          <a:xfrm>
+            <a:off x="9064978" y="5441950"/>
+            <a:ext cx="2813307" cy="914400"/>
+            <a:chOff x="9064978" y="5441950"/>
+            <a:chExt cx="2813307" cy="914400"/>
+          </a:xfrm>
+        </p:grpSpPr>
+        <p:sp>
+          <p:nvSpPr>
+            <p:cNvPr id="7" name="Rectangle 6">
+              <a:extLst>
+                <a:ext uri="{FF2B5EF4-FFF2-40B4-BE49-F238E27FC236}">
+                  <a16:creationId xmlns:a16="http://schemas.microsoft.com/office/drawing/2014/main" id="{6CB11481-E14F-4CB2-B4A9-4BDA5BBC84F3}"/>
+                </a:ext>
+              </a:extLst>
+            </p:cNvPr>
+            <p:cNvSpPr/>
+            <p:nvPr/>
+          </p:nvSpPr>
+          <p:spPr>
+            <a:xfrm>
+              <a:off x="9064978" y="5441950"/>
+              <a:ext cx="2813307" cy="914400"/>
+            </a:xfrm>
+            <a:prstGeom prst="rect">
+              <a:avLst/>
+            </a:prstGeom>
+            <a:solidFill>
+              <a:schemeClr val="bg1">
+                <a:lumMod val="95000"/>
+              </a:schemeClr>
+            </a:solidFill>
+            <a:ln>
+              <a:solidFill>
+                <a:schemeClr val="bg1">
+                  <a:lumMod val="65000"/>
+                </a:schemeClr>
+              </a:solidFill>
+            </a:ln>
+          </p:spPr>
+          <p:style>
+            <a:lnRef idx="2">
+              <a:schemeClr val="accent1">
+                <a:shade val="50000"/>
+              </a:schemeClr>
+            </a:lnRef>
+            <a:fillRef idx="1">
+              <a:schemeClr val="accent1"/>
+            </a:fillRef>
+            <a:effectRef idx="0">
+              <a:schemeClr val="accent1"/>
+            </a:effectRef>
+            <a:fontRef idx="minor">
+              <a:schemeClr val="lt1"/>
+            </a:fontRef>
+          </p:style>
+          <p:txBody>
+            <a:bodyPr rtlCol="0" anchor="ctr"/>
+            <a:lstStyle/>
+            <a:p>
+              <a:pPr algn="ctr"/>
+              <a:endParaRPr lang="en-US"/>
+            </a:p>
+          </p:txBody>
+        </p:sp>
+        <p:grpSp>
+          <p:nvGrpSpPr>
+            <p:cNvPr id="8" name="Group 7">
+              <a:extLst>
+                <a:ext uri="{FF2B5EF4-FFF2-40B4-BE49-F238E27FC236}">
+                  <a16:creationId xmlns:a16="http://schemas.microsoft.com/office/drawing/2014/main" id="{499A6D2B-9790-4A56-BE41-C78EDFDDBDC8}"/>
+                </a:ext>
+              </a:extLst>
+            </p:cNvPr>
+            <p:cNvGrpSpPr/>
+            <p:nvPr/>
+          </p:nvGrpSpPr>
+          <p:grpSpPr>
+            <a:xfrm>
+              <a:off x="9164782" y="5441950"/>
+              <a:ext cx="2713503" cy="914400"/>
+              <a:chOff x="9164782" y="5441950"/>
+              <a:chExt cx="2713503" cy="914400"/>
+            </a:xfrm>
+          </p:grpSpPr>
+          <p:pic>
+            <p:nvPicPr>
+              <p:cNvPr id="9" name="Graphic 8" descr="Stopwatch">
+                <a:extLst>
+                  <a:ext uri="{FF2B5EF4-FFF2-40B4-BE49-F238E27FC236}">
+                    <a16:creationId xmlns:a16="http://schemas.microsoft.com/office/drawing/2014/main" id="{2E959524-F2FA-430E-8A87-5026C794BB75}"/>
+                  </a:ext>
+                </a:extLst>
+              </p:cNvPr>
+              <p:cNvPicPr>
+                <a:picLocks noChangeAspect="1"/>
+              </p:cNvPicPr>
+              <p:nvPr/>
+            </p:nvPicPr>
+            <p:blipFill>
+              <a:blip r:embed="rId2">
+                <a:extLst>
+                  <a:ext uri="{28A0092B-C50C-407E-A947-70E740481C1C}">
+                    <a14:useLocalDpi xmlns:a14="http://schemas.microsoft.com/office/drawing/2010/main" val="0"/>
+                  </a:ext>
+                  <a:ext uri="{96DAC541-7B7A-43D3-8B79-37D633B846F1}">
+                    <asvg:svgBlip xmlns:asvg="http://schemas.microsoft.com/office/drawing/2016/SVG/main" r:embed="rId3"/>
+                  </a:ext>
+                </a:extLst>
+              </a:blip>
+              <a:stretch>
+                <a:fillRect/>
+              </a:stretch>
+            </p:blipFill>
+            <p:spPr>
+              <a:xfrm>
+                <a:off x="9164782" y="5441950"/>
+                <a:ext cx="914400" cy="914400"/>
+              </a:xfrm>
+              <a:prstGeom prst="rect">
+                <a:avLst/>
+              </a:prstGeom>
+            </p:spPr>
+          </p:pic>
+          <p:sp>
+            <p:nvSpPr>
+              <p:cNvPr id="10" name="TextBox 9">
+                <a:extLst>
+                  <a:ext uri="{FF2B5EF4-FFF2-40B4-BE49-F238E27FC236}">
+                    <a16:creationId xmlns:a16="http://schemas.microsoft.com/office/drawing/2014/main" id="{3A5E725A-C846-4409-BC7A-F051E5804DAC}"/>
+                  </a:ext>
+                </a:extLst>
+              </p:cNvPr>
+              <p:cNvSpPr txBox="1"/>
+              <p:nvPr/>
+            </p:nvSpPr>
+            <p:spPr>
+              <a:xfrm>
+                <a:off x="9958853" y="5586909"/>
+                <a:ext cx="1919432" cy="769441"/>
+              </a:xfrm>
+              <a:prstGeom prst="rect">
+                <a:avLst/>
+              </a:prstGeom>
+              <a:noFill/>
+            </p:spPr>
+            <p:txBody>
+              <a:bodyPr wrap="square" rtlCol="0">
+                <a:spAutoFit/>
+              </a:bodyPr>
+              <a:lstStyle/>
+              <a:p>
+                <a:r>
+                  <a:rPr lang="en-US" sz="4400" dirty="0">
+                    <a:latin typeface="Fira Code" panose="020B0809050000020004" pitchFamily="49" charset="0"/>
+                    <a:ea typeface="Fira Code" panose="020B0809050000020004" pitchFamily="49" charset="0"/>
+                    <a:cs typeface="Fira Code" panose="020B0809050000020004" pitchFamily="49" charset="0"/>
+                  </a:rPr>
+                  <a:t>05:00</a:t>
+                </a:r>
+              </a:p>
+            </p:txBody>
+          </p:sp>
+        </p:grpSp>
+      </p:grpSp>
     </p:spTree>
     <p:extLst>
       <p:ext uri="{BB962C8B-B14F-4D97-AF65-F5344CB8AC3E}">

</xml_diff>